<commit_message>
updated slides with Flask
</commit_message>
<xml_diff>
--- a/Dave/Modeling.pptx
+++ b/Dave/Modeling.pptx
@@ -4,6 +4,9 @@
   <p:sldMasterIdLst>
     <p:sldMasterId id="2147483648" r:id="rId1"/>
   </p:sldMasterIdLst>
+  <p:notesMasterIdLst>
+    <p:notesMasterId r:id="rId13"/>
+  </p:notesMasterIdLst>
   <p:sldIdLst>
     <p:sldId id="256" r:id="rId2"/>
     <p:sldId id="257" r:id="rId3"/>
@@ -11,6 +14,11 @@
     <p:sldId id="261" r:id="rId5"/>
     <p:sldId id="259" r:id="rId6"/>
     <p:sldId id="260" r:id="rId7"/>
+    <p:sldId id="262" r:id="rId8"/>
+    <p:sldId id="265" r:id="rId9"/>
+    <p:sldId id="263" r:id="rId10"/>
+    <p:sldId id="264" r:id="rId11"/>
+    <p:sldId id="266" r:id="rId12"/>
   </p:sldIdLst>
   <p:sldSz cx="12192000" cy="6858000"/>
   <p:notesSz cx="6858000" cy="9144000"/>
@@ -117,6 +125,667 @@
 </p:presentation>
 </file>
 
+<file path=ppt/notesMasters/notesMaster1.xml><?xml version="1.0" encoding="utf-8"?>
+<p:notesMaster xmlns:a="http://schemas.openxmlformats.org/drawingml/2006/main" xmlns:r="http://schemas.openxmlformats.org/officeDocument/2006/relationships" xmlns:p="http://schemas.openxmlformats.org/presentationml/2006/main">
+  <p:cSld>
+    <p:bg>
+      <p:bgRef idx="1001">
+        <a:schemeClr val="bg1"/>
+      </p:bgRef>
+    </p:bg>
+    <p:spTree>
+      <p:nvGrpSpPr>
+        <p:cNvPr id="1" name=""/>
+        <p:cNvGrpSpPr/>
+        <p:nvPr/>
+      </p:nvGrpSpPr>
+      <p:grpSpPr>
+        <a:xfrm>
+          <a:off x="0" y="0"/>
+          <a:ext cx="0" cy="0"/>
+          <a:chOff x="0" y="0"/>
+          <a:chExt cx="0" cy="0"/>
+        </a:xfrm>
+      </p:grpSpPr>
+      <p:sp>
+        <p:nvSpPr>
+          <p:cNvPr id="2" name="Header Placeholder 1"/>
+          <p:cNvSpPr>
+            <a:spLocks noGrp="1"/>
+          </p:cNvSpPr>
+          <p:nvPr>
+            <p:ph type="hdr" sz="quarter"/>
+          </p:nvPr>
+        </p:nvSpPr>
+        <p:spPr>
+          <a:xfrm>
+            <a:off x="0" y="0"/>
+            <a:ext cx="2971800" cy="458788"/>
+          </a:xfrm>
+          <a:prstGeom prst="rect">
+            <a:avLst/>
+          </a:prstGeom>
+        </p:spPr>
+        <p:txBody>
+          <a:bodyPr vert="horz" lIns="91440" tIns="45720" rIns="91440" bIns="45720" rtlCol="0"/>
+          <a:lstStyle>
+            <a:lvl1pPr algn="l">
+              <a:defRPr sz="1200"/>
+            </a:lvl1pPr>
+          </a:lstStyle>
+          <a:p>
+            <a:endParaRPr lang="en-US"/>
+          </a:p>
+        </p:txBody>
+      </p:sp>
+      <p:sp>
+        <p:nvSpPr>
+          <p:cNvPr id="3" name="Date Placeholder 2"/>
+          <p:cNvSpPr>
+            <a:spLocks noGrp="1"/>
+          </p:cNvSpPr>
+          <p:nvPr>
+            <p:ph type="dt" idx="1"/>
+          </p:nvPr>
+        </p:nvSpPr>
+        <p:spPr>
+          <a:xfrm>
+            <a:off x="3884613" y="0"/>
+            <a:ext cx="2971800" cy="458788"/>
+          </a:xfrm>
+          <a:prstGeom prst="rect">
+            <a:avLst/>
+          </a:prstGeom>
+        </p:spPr>
+        <p:txBody>
+          <a:bodyPr vert="horz" lIns="91440" tIns="45720" rIns="91440" bIns="45720" rtlCol="0"/>
+          <a:lstStyle>
+            <a:lvl1pPr algn="r">
+              <a:defRPr sz="1200"/>
+            </a:lvl1pPr>
+          </a:lstStyle>
+          <a:p>
+            <a:fld id="{C00EAB4B-7875-4BC6-B3D7-FA7FA0BA60C8}" type="datetimeFigureOut">
+              <a:rPr lang="en-US" smtClean="0"/>
+              <a:t>12/11/2018</a:t>
+            </a:fld>
+            <a:endParaRPr lang="en-US"/>
+          </a:p>
+        </p:txBody>
+      </p:sp>
+      <p:sp>
+        <p:nvSpPr>
+          <p:cNvPr id="4" name="Slide Image Placeholder 3"/>
+          <p:cNvSpPr>
+            <a:spLocks noGrp="1" noRot="1" noChangeAspect="1"/>
+          </p:cNvSpPr>
+          <p:nvPr>
+            <p:ph type="sldImg" idx="2"/>
+          </p:nvPr>
+        </p:nvSpPr>
+        <p:spPr>
+          <a:xfrm>
+            <a:off x="685800" y="1143000"/>
+            <a:ext cx="5486400" cy="3086100"/>
+          </a:xfrm>
+          <a:prstGeom prst="rect">
+            <a:avLst/>
+          </a:prstGeom>
+          <a:noFill/>
+          <a:ln w="12700">
+            <a:solidFill>
+              <a:prstClr val="black"/>
+            </a:solidFill>
+          </a:ln>
+        </p:spPr>
+        <p:txBody>
+          <a:bodyPr vert="horz" lIns="91440" tIns="45720" rIns="91440" bIns="45720" rtlCol="0" anchor="ctr"/>
+          <a:lstStyle/>
+          <a:p>
+            <a:endParaRPr lang="en-US"/>
+          </a:p>
+        </p:txBody>
+      </p:sp>
+      <p:sp>
+        <p:nvSpPr>
+          <p:cNvPr id="5" name="Notes Placeholder 4"/>
+          <p:cNvSpPr>
+            <a:spLocks noGrp="1"/>
+          </p:cNvSpPr>
+          <p:nvPr>
+            <p:ph type="body" sz="quarter" idx="3"/>
+          </p:nvPr>
+        </p:nvSpPr>
+        <p:spPr>
+          <a:xfrm>
+            <a:off x="685800" y="4400550"/>
+            <a:ext cx="5486400" cy="3600450"/>
+          </a:xfrm>
+          <a:prstGeom prst="rect">
+            <a:avLst/>
+          </a:prstGeom>
+        </p:spPr>
+        <p:txBody>
+          <a:bodyPr vert="horz" lIns="91440" tIns="45720" rIns="91440" bIns="45720" rtlCol="0"/>
+          <a:lstStyle/>
+          <a:p>
+            <a:pPr lvl="0"/>
+            <a:r>
+              <a:rPr lang="en-US"/>
+              <a:t>Edit Master text styles</a:t>
+            </a:r>
+          </a:p>
+          <a:p>
+            <a:pPr lvl="1"/>
+            <a:r>
+              <a:rPr lang="en-US"/>
+              <a:t>Second level</a:t>
+            </a:r>
+          </a:p>
+          <a:p>
+            <a:pPr lvl="2"/>
+            <a:r>
+              <a:rPr lang="en-US"/>
+              <a:t>Third level</a:t>
+            </a:r>
+          </a:p>
+          <a:p>
+            <a:pPr lvl="3"/>
+            <a:r>
+              <a:rPr lang="en-US"/>
+              <a:t>Fourth level</a:t>
+            </a:r>
+          </a:p>
+          <a:p>
+            <a:pPr lvl="4"/>
+            <a:r>
+              <a:rPr lang="en-US"/>
+              <a:t>Fifth level</a:t>
+            </a:r>
+          </a:p>
+        </p:txBody>
+      </p:sp>
+      <p:sp>
+        <p:nvSpPr>
+          <p:cNvPr id="6" name="Footer Placeholder 5"/>
+          <p:cNvSpPr>
+            <a:spLocks noGrp="1"/>
+          </p:cNvSpPr>
+          <p:nvPr>
+            <p:ph type="ftr" sz="quarter" idx="4"/>
+          </p:nvPr>
+        </p:nvSpPr>
+        <p:spPr>
+          <a:xfrm>
+            <a:off x="0" y="8685213"/>
+            <a:ext cx="2971800" cy="458787"/>
+          </a:xfrm>
+          <a:prstGeom prst="rect">
+            <a:avLst/>
+          </a:prstGeom>
+        </p:spPr>
+        <p:txBody>
+          <a:bodyPr vert="horz" lIns="91440" tIns="45720" rIns="91440" bIns="45720" rtlCol="0" anchor="b"/>
+          <a:lstStyle>
+            <a:lvl1pPr algn="l">
+              <a:defRPr sz="1200"/>
+            </a:lvl1pPr>
+          </a:lstStyle>
+          <a:p>
+            <a:endParaRPr lang="en-US"/>
+          </a:p>
+        </p:txBody>
+      </p:sp>
+      <p:sp>
+        <p:nvSpPr>
+          <p:cNvPr id="7" name="Slide Number Placeholder 6"/>
+          <p:cNvSpPr>
+            <a:spLocks noGrp="1"/>
+          </p:cNvSpPr>
+          <p:nvPr>
+            <p:ph type="sldNum" sz="quarter" idx="5"/>
+          </p:nvPr>
+        </p:nvSpPr>
+        <p:spPr>
+          <a:xfrm>
+            <a:off x="3884613" y="8685213"/>
+            <a:ext cx="2971800" cy="458787"/>
+          </a:xfrm>
+          <a:prstGeom prst="rect">
+            <a:avLst/>
+          </a:prstGeom>
+        </p:spPr>
+        <p:txBody>
+          <a:bodyPr vert="horz" lIns="91440" tIns="45720" rIns="91440" bIns="45720" rtlCol="0" anchor="b"/>
+          <a:lstStyle>
+            <a:lvl1pPr algn="r">
+              <a:defRPr sz="1200"/>
+            </a:lvl1pPr>
+          </a:lstStyle>
+          <a:p>
+            <a:fld id="{E02E40BC-C7CF-4823-94F9-AD533BBBBB94}" type="slidenum">
+              <a:rPr lang="en-US" smtClean="0"/>
+              <a:t>‹#›</a:t>
+            </a:fld>
+            <a:endParaRPr lang="en-US"/>
+          </a:p>
+        </p:txBody>
+      </p:sp>
+    </p:spTree>
+    <p:extLst>
+      <p:ext uri="{BB962C8B-B14F-4D97-AF65-F5344CB8AC3E}">
+        <p14:creationId xmlns:p14="http://schemas.microsoft.com/office/powerpoint/2010/main" val="3765157079"/>
+      </p:ext>
+    </p:extLst>
+  </p:cSld>
+  <p:clrMap bg1="lt1" tx1="dk1" bg2="lt2" tx2="dk2" accent1="accent1" accent2="accent2" accent3="accent3" accent4="accent4" accent5="accent5" accent6="accent6" hlink="hlink" folHlink="folHlink"/>
+  <p:notesStyle>
+    <a:lvl1pPr marL="0" algn="l" defTabSz="914400" rtl="0" eaLnBrk="1" latinLnBrk="0" hangingPunct="1">
+      <a:defRPr sz="1200" kern="1200">
+        <a:solidFill>
+          <a:schemeClr val="tx1"/>
+        </a:solidFill>
+        <a:latin typeface="+mn-lt"/>
+        <a:ea typeface="+mn-ea"/>
+        <a:cs typeface="+mn-cs"/>
+      </a:defRPr>
+    </a:lvl1pPr>
+    <a:lvl2pPr marL="457200" algn="l" defTabSz="914400" rtl="0" eaLnBrk="1" latinLnBrk="0" hangingPunct="1">
+      <a:defRPr sz="1200" kern="1200">
+        <a:solidFill>
+          <a:schemeClr val="tx1"/>
+        </a:solidFill>
+        <a:latin typeface="+mn-lt"/>
+        <a:ea typeface="+mn-ea"/>
+        <a:cs typeface="+mn-cs"/>
+      </a:defRPr>
+    </a:lvl2pPr>
+    <a:lvl3pPr marL="914400" algn="l" defTabSz="914400" rtl="0" eaLnBrk="1" latinLnBrk="0" hangingPunct="1">
+      <a:defRPr sz="1200" kern="1200">
+        <a:solidFill>
+          <a:schemeClr val="tx1"/>
+        </a:solidFill>
+        <a:latin typeface="+mn-lt"/>
+        <a:ea typeface="+mn-ea"/>
+        <a:cs typeface="+mn-cs"/>
+      </a:defRPr>
+    </a:lvl3pPr>
+    <a:lvl4pPr marL="1371600" algn="l" defTabSz="914400" rtl="0" eaLnBrk="1" latinLnBrk="0" hangingPunct="1">
+      <a:defRPr sz="1200" kern="1200">
+        <a:solidFill>
+          <a:schemeClr val="tx1"/>
+        </a:solidFill>
+        <a:latin typeface="+mn-lt"/>
+        <a:ea typeface="+mn-ea"/>
+        <a:cs typeface="+mn-cs"/>
+      </a:defRPr>
+    </a:lvl4pPr>
+    <a:lvl5pPr marL="1828800" algn="l" defTabSz="914400" rtl="0" eaLnBrk="1" latinLnBrk="0" hangingPunct="1">
+      <a:defRPr sz="1200" kern="1200">
+        <a:solidFill>
+          <a:schemeClr val="tx1"/>
+        </a:solidFill>
+        <a:latin typeface="+mn-lt"/>
+        <a:ea typeface="+mn-ea"/>
+        <a:cs typeface="+mn-cs"/>
+      </a:defRPr>
+    </a:lvl5pPr>
+    <a:lvl6pPr marL="2286000" algn="l" defTabSz="914400" rtl="0" eaLnBrk="1" latinLnBrk="0" hangingPunct="1">
+      <a:defRPr sz="1200" kern="1200">
+        <a:solidFill>
+          <a:schemeClr val="tx1"/>
+        </a:solidFill>
+        <a:latin typeface="+mn-lt"/>
+        <a:ea typeface="+mn-ea"/>
+        <a:cs typeface="+mn-cs"/>
+      </a:defRPr>
+    </a:lvl6pPr>
+    <a:lvl7pPr marL="2743200" algn="l" defTabSz="914400" rtl="0" eaLnBrk="1" latinLnBrk="0" hangingPunct="1">
+      <a:defRPr sz="1200" kern="1200">
+        <a:solidFill>
+          <a:schemeClr val="tx1"/>
+        </a:solidFill>
+        <a:latin typeface="+mn-lt"/>
+        <a:ea typeface="+mn-ea"/>
+        <a:cs typeface="+mn-cs"/>
+      </a:defRPr>
+    </a:lvl7pPr>
+    <a:lvl8pPr marL="3200400" algn="l" defTabSz="914400" rtl="0" eaLnBrk="1" latinLnBrk="0" hangingPunct="1">
+      <a:defRPr sz="1200" kern="1200">
+        <a:solidFill>
+          <a:schemeClr val="tx1"/>
+        </a:solidFill>
+        <a:latin typeface="+mn-lt"/>
+        <a:ea typeface="+mn-ea"/>
+        <a:cs typeface="+mn-cs"/>
+      </a:defRPr>
+    </a:lvl8pPr>
+    <a:lvl9pPr marL="3657600" algn="l" defTabSz="914400" rtl="0" eaLnBrk="1" latinLnBrk="0" hangingPunct="1">
+      <a:defRPr sz="1200" kern="1200">
+        <a:solidFill>
+          <a:schemeClr val="tx1"/>
+        </a:solidFill>
+        <a:latin typeface="+mn-lt"/>
+        <a:ea typeface="+mn-ea"/>
+        <a:cs typeface="+mn-cs"/>
+      </a:defRPr>
+    </a:lvl9pPr>
+  </p:notesStyle>
+</p:notesMaster>
+</file>
+
+<file path=ppt/notesSlides/notesSlide1.xml><?xml version="1.0" encoding="utf-8"?>
+<p:notes xmlns:a="http://schemas.openxmlformats.org/drawingml/2006/main" xmlns:r="http://schemas.openxmlformats.org/officeDocument/2006/relationships" xmlns:p="http://schemas.openxmlformats.org/presentationml/2006/main" showMasterSp="0" showMasterPhAnim="0">
+  <p:cSld>
+    <p:spTree>
+      <p:nvGrpSpPr>
+        <p:cNvPr id="1" name="Shape 50"/>
+        <p:cNvGrpSpPr/>
+        <p:nvPr/>
+      </p:nvGrpSpPr>
+      <p:grpSpPr>
+        <a:xfrm>
+          <a:off x="0" y="0"/>
+          <a:ext cx="0" cy="0"/>
+          <a:chOff x="0" y="0"/>
+          <a:chExt cx="0" cy="0"/>
+        </a:xfrm>
+      </p:grpSpPr>
+      <p:sp>
+        <p:nvSpPr>
+          <p:cNvPr id="51" name="Google Shape;51;p:notes"/>
+          <p:cNvSpPr>
+            <a:spLocks noGrp="1" noRot="1" noChangeAspect="1"/>
+          </p:cNvSpPr>
+          <p:nvPr>
+            <p:ph type="sldImg" idx="2"/>
+          </p:nvPr>
+        </p:nvSpPr>
+        <p:spPr>
+          <a:xfrm>
+            <a:off x="381000" y="685800"/>
+            <a:ext cx="6096000" cy="3429000"/>
+          </a:xfrm>
+          <a:custGeom>
+            <a:avLst/>
+            <a:gdLst/>
+            <a:ahLst/>
+            <a:cxnLst/>
+            <a:rect l="l" t="t" r="r" b="b"/>
+            <a:pathLst>
+              <a:path w="120000" h="120000" extrusionOk="0">
+                <a:moveTo>
+                  <a:pt x="0" y="0"/>
+                </a:moveTo>
+                <a:lnTo>
+                  <a:pt x="120000" y="0"/>
+                </a:lnTo>
+                <a:lnTo>
+                  <a:pt x="120000" y="120000"/>
+                </a:lnTo>
+                <a:lnTo>
+                  <a:pt x="0" y="120000"/>
+                </a:lnTo>
+                <a:close/>
+              </a:path>
+            </a:pathLst>
+          </a:custGeom>
+        </p:spPr>
+      </p:sp>
+      <p:sp>
+        <p:nvSpPr>
+          <p:cNvPr id="52" name="Google Shape;52;p:notes"/>
+          <p:cNvSpPr txBox="1">
+            <a:spLocks noGrp="1"/>
+          </p:cNvSpPr>
+          <p:nvPr>
+            <p:ph type="body" idx="1"/>
+          </p:nvPr>
+        </p:nvSpPr>
+        <p:spPr>
+          <a:xfrm>
+            <a:off x="685800" y="4343400"/>
+            <a:ext cx="5486400" cy="4114800"/>
+          </a:xfrm>
+          <a:prstGeom prst="rect">
+            <a:avLst/>
+          </a:prstGeom>
+        </p:spPr>
+        <p:txBody>
+          <a:bodyPr spcFirstLastPara="1" wrap="square" lIns="91425" tIns="91425" rIns="91425" bIns="91425" anchor="t" anchorCtr="0">
+            <a:noAutofit/>
+          </a:bodyPr>
+          <a:lstStyle/>
+          <a:p>
+            <a:pPr marL="0" lvl="0" indent="0" algn="l" rtl="0">
+              <a:spcBef>
+                <a:spcPts val="0"/>
+              </a:spcBef>
+              <a:spcAft>
+                <a:spcPts val="0"/>
+              </a:spcAft>
+              <a:buNone/>
+            </a:pPr>
+            <a:endParaRPr/>
+          </a:p>
+        </p:txBody>
+      </p:sp>
+    </p:spTree>
+  </p:cSld>
+  <p:clrMapOvr>
+    <a:masterClrMapping/>
+  </p:clrMapOvr>
+</p:notes>
+</file>
+
+<file path=ppt/notesSlides/notesSlide2.xml><?xml version="1.0" encoding="utf-8"?>
+<p:notes xmlns:a="http://schemas.openxmlformats.org/drawingml/2006/main" xmlns:r="http://schemas.openxmlformats.org/officeDocument/2006/relationships" xmlns:p="http://schemas.openxmlformats.org/presentationml/2006/main" showMasterSp="0" showMasterPhAnim="0">
+  <p:cSld>
+    <p:spTree>
+      <p:nvGrpSpPr>
+        <p:cNvPr id="1" name="Shape 56"/>
+        <p:cNvGrpSpPr/>
+        <p:nvPr/>
+      </p:nvGrpSpPr>
+      <p:grpSpPr>
+        <a:xfrm>
+          <a:off x="0" y="0"/>
+          <a:ext cx="0" cy="0"/>
+          <a:chOff x="0" y="0"/>
+          <a:chExt cx="0" cy="0"/>
+        </a:xfrm>
+      </p:grpSpPr>
+      <p:sp>
+        <p:nvSpPr>
+          <p:cNvPr id="57" name="Google Shape;57;g49d9602f49_0_0:notes"/>
+          <p:cNvSpPr>
+            <a:spLocks noGrp="1" noRot="1" noChangeAspect="1"/>
+          </p:cNvSpPr>
+          <p:nvPr>
+            <p:ph type="sldImg" idx="2"/>
+          </p:nvPr>
+        </p:nvSpPr>
+        <p:spPr>
+          <a:xfrm>
+            <a:off x="381300" y="685800"/>
+            <a:ext cx="6096000" cy="3429000"/>
+          </a:xfrm>
+          <a:custGeom>
+            <a:avLst/>
+            <a:gdLst/>
+            <a:ahLst/>
+            <a:cxnLst/>
+            <a:rect l="l" t="t" r="r" b="b"/>
+            <a:pathLst>
+              <a:path w="120000" h="120000" extrusionOk="0">
+                <a:moveTo>
+                  <a:pt x="0" y="0"/>
+                </a:moveTo>
+                <a:lnTo>
+                  <a:pt x="120000" y="0"/>
+                </a:lnTo>
+                <a:lnTo>
+                  <a:pt x="120000" y="120000"/>
+                </a:lnTo>
+                <a:lnTo>
+                  <a:pt x="0" y="120000"/>
+                </a:lnTo>
+                <a:close/>
+              </a:path>
+            </a:pathLst>
+          </a:custGeom>
+        </p:spPr>
+      </p:sp>
+      <p:sp>
+        <p:nvSpPr>
+          <p:cNvPr id="58" name="Google Shape;58;g49d9602f49_0_0:notes"/>
+          <p:cNvSpPr txBox="1">
+            <a:spLocks noGrp="1"/>
+          </p:cNvSpPr>
+          <p:nvPr>
+            <p:ph type="body" idx="1"/>
+          </p:nvPr>
+        </p:nvSpPr>
+        <p:spPr>
+          <a:xfrm>
+            <a:off x="685800" y="4343400"/>
+            <a:ext cx="5486400" cy="4114800"/>
+          </a:xfrm>
+          <a:prstGeom prst="rect">
+            <a:avLst/>
+          </a:prstGeom>
+        </p:spPr>
+        <p:txBody>
+          <a:bodyPr spcFirstLastPara="1" wrap="square" lIns="91425" tIns="91425" rIns="91425" bIns="91425" anchor="t" anchorCtr="0">
+            <a:noAutofit/>
+          </a:bodyPr>
+          <a:lstStyle/>
+          <a:p>
+            <a:pPr marL="0" lvl="0" indent="0" algn="l" rtl="0">
+              <a:spcBef>
+                <a:spcPts val="0"/>
+              </a:spcBef>
+              <a:spcAft>
+                <a:spcPts val="0"/>
+              </a:spcAft>
+              <a:buNone/>
+            </a:pPr>
+            <a:endParaRPr/>
+          </a:p>
+        </p:txBody>
+      </p:sp>
+    </p:spTree>
+  </p:cSld>
+  <p:clrMapOvr>
+    <a:masterClrMapping/>
+  </p:clrMapOvr>
+</p:notes>
+</file>
+
+<file path=ppt/notesSlides/notesSlide3.xml><?xml version="1.0" encoding="utf-8"?>
+<p:notes xmlns:a="http://schemas.openxmlformats.org/drawingml/2006/main" xmlns:r="http://schemas.openxmlformats.org/officeDocument/2006/relationships" xmlns:p="http://schemas.openxmlformats.org/presentationml/2006/main" showMasterSp="0" showMasterPhAnim="0">
+  <p:cSld>
+    <p:spTree>
+      <p:nvGrpSpPr>
+        <p:cNvPr id="1" name="Shape 63"/>
+        <p:cNvGrpSpPr/>
+        <p:nvPr/>
+      </p:nvGrpSpPr>
+      <p:grpSpPr>
+        <a:xfrm>
+          <a:off x="0" y="0"/>
+          <a:ext cx="0" cy="0"/>
+          <a:chOff x="0" y="0"/>
+          <a:chExt cx="0" cy="0"/>
+        </a:xfrm>
+      </p:grpSpPr>
+      <p:sp>
+        <p:nvSpPr>
+          <p:cNvPr id="64" name="Google Shape;64;g49d9602f49_0_9:notes"/>
+          <p:cNvSpPr>
+            <a:spLocks noGrp="1" noRot="1" noChangeAspect="1"/>
+          </p:cNvSpPr>
+          <p:nvPr>
+            <p:ph type="sldImg" idx="2"/>
+          </p:nvPr>
+        </p:nvSpPr>
+        <p:spPr>
+          <a:xfrm>
+            <a:off x="381300" y="685800"/>
+            <a:ext cx="6096000" cy="3429000"/>
+          </a:xfrm>
+          <a:custGeom>
+            <a:avLst/>
+            <a:gdLst/>
+            <a:ahLst/>
+            <a:cxnLst/>
+            <a:rect l="l" t="t" r="r" b="b"/>
+            <a:pathLst>
+              <a:path w="120000" h="120000" extrusionOk="0">
+                <a:moveTo>
+                  <a:pt x="0" y="0"/>
+                </a:moveTo>
+                <a:lnTo>
+                  <a:pt x="120000" y="0"/>
+                </a:lnTo>
+                <a:lnTo>
+                  <a:pt x="120000" y="120000"/>
+                </a:lnTo>
+                <a:lnTo>
+                  <a:pt x="0" y="120000"/>
+                </a:lnTo>
+                <a:close/>
+              </a:path>
+            </a:pathLst>
+          </a:custGeom>
+        </p:spPr>
+      </p:sp>
+      <p:sp>
+        <p:nvSpPr>
+          <p:cNvPr id="65" name="Google Shape;65;g49d9602f49_0_9:notes"/>
+          <p:cNvSpPr txBox="1">
+            <a:spLocks noGrp="1"/>
+          </p:cNvSpPr>
+          <p:nvPr>
+            <p:ph type="body" idx="1"/>
+          </p:nvPr>
+        </p:nvSpPr>
+        <p:spPr>
+          <a:xfrm>
+            <a:off x="685800" y="4343400"/>
+            <a:ext cx="5486400" cy="4114800"/>
+          </a:xfrm>
+          <a:prstGeom prst="rect">
+            <a:avLst/>
+          </a:prstGeom>
+        </p:spPr>
+        <p:txBody>
+          <a:bodyPr spcFirstLastPara="1" wrap="square" lIns="91425" tIns="91425" rIns="91425" bIns="91425" anchor="t" anchorCtr="0">
+            <a:noAutofit/>
+          </a:bodyPr>
+          <a:lstStyle/>
+          <a:p>
+            <a:pPr marL="0" lvl="0" indent="0" algn="l" rtl="0">
+              <a:spcBef>
+                <a:spcPts val="0"/>
+              </a:spcBef>
+              <a:spcAft>
+                <a:spcPts val="0"/>
+              </a:spcAft>
+              <a:buNone/>
+            </a:pPr>
+            <a:endParaRPr/>
+          </a:p>
+        </p:txBody>
+      </p:sp>
+    </p:spTree>
+  </p:cSld>
+  <p:clrMapOvr>
+    <a:masterClrMapping/>
+  </p:clrMapOvr>
+</p:notes>
+</file>
+
 <file path=ppt/slideLayouts/slideLayout1.xml><?xml version="1.0" encoding="utf-8"?>
 <p:sldLayout xmlns:a="http://schemas.openxmlformats.org/drawingml/2006/main" xmlns:r="http://schemas.openxmlformats.org/officeDocument/2006/relationships" xmlns:p="http://schemas.openxmlformats.org/presentationml/2006/main" type="title" preserve="1">
   <p:cSld name="Title Slide">
@@ -734,6 +1403,716 @@
     <p:extLst>
       <p:ext uri="{BB962C8B-B14F-4D97-AF65-F5344CB8AC3E}">
         <p14:creationId xmlns:p14="http://schemas.microsoft.com/office/powerpoint/2010/main" val="2146081904"/>
+      </p:ext>
+    </p:extLst>
+  </p:cSld>
+  <p:clrMapOvr>
+    <a:masterClrMapping/>
+  </p:clrMapOvr>
+</p:sldLayout>
+</file>
+
+<file path=ppt/slideLayouts/slideLayout12.xml><?xml version="1.0" encoding="utf-8"?>
+<p:sldLayout xmlns:a="http://schemas.openxmlformats.org/drawingml/2006/main" xmlns:r="http://schemas.openxmlformats.org/officeDocument/2006/relationships" xmlns:p="http://schemas.openxmlformats.org/presentationml/2006/main" matchingName="Title and two columns" type="twoColTx">
+  <p:cSld name="Title and two columns">
+    <p:spTree>
+      <p:nvGrpSpPr>
+        <p:cNvPr id="1" name="Shape 20"/>
+        <p:cNvGrpSpPr/>
+        <p:nvPr/>
+      </p:nvGrpSpPr>
+      <p:grpSpPr>
+        <a:xfrm>
+          <a:off x="0" y="0"/>
+          <a:ext cx="0" cy="0"/>
+          <a:chOff x="0" y="0"/>
+          <a:chExt cx="0" cy="0"/>
+        </a:xfrm>
+      </p:grpSpPr>
+      <p:sp>
+        <p:nvSpPr>
+          <p:cNvPr id="21" name="Google Shape;21;p5"/>
+          <p:cNvSpPr txBox="1">
+            <a:spLocks noGrp="1"/>
+          </p:cNvSpPr>
+          <p:nvPr>
+            <p:ph type="title"/>
+          </p:nvPr>
+        </p:nvSpPr>
+        <p:spPr>
+          <a:xfrm>
+            <a:off x="415600" y="593367"/>
+            <a:ext cx="11360800" cy="763600"/>
+          </a:xfrm>
+          <a:prstGeom prst="rect">
+            <a:avLst/>
+          </a:prstGeom>
+        </p:spPr>
+        <p:txBody>
+          <a:bodyPr spcFirstLastPara="1" wrap="square" lIns="91425" tIns="91425" rIns="91425" bIns="91425" anchor="t" anchorCtr="0"/>
+          <a:lstStyle>
+            <a:lvl1pPr lvl="0">
+              <a:spcBef>
+                <a:spcPts val="0"/>
+              </a:spcBef>
+              <a:spcAft>
+                <a:spcPts val="0"/>
+              </a:spcAft>
+              <a:buSzPts val="2800"/>
+              <a:buNone/>
+              <a:defRPr/>
+            </a:lvl1pPr>
+            <a:lvl2pPr lvl="1">
+              <a:spcBef>
+                <a:spcPts val="0"/>
+              </a:spcBef>
+              <a:spcAft>
+                <a:spcPts val="0"/>
+              </a:spcAft>
+              <a:buSzPts val="2800"/>
+              <a:buNone/>
+              <a:defRPr/>
+            </a:lvl2pPr>
+            <a:lvl3pPr lvl="2">
+              <a:spcBef>
+                <a:spcPts val="0"/>
+              </a:spcBef>
+              <a:spcAft>
+                <a:spcPts val="0"/>
+              </a:spcAft>
+              <a:buSzPts val="2800"/>
+              <a:buNone/>
+              <a:defRPr/>
+            </a:lvl3pPr>
+            <a:lvl4pPr lvl="3">
+              <a:spcBef>
+                <a:spcPts val="0"/>
+              </a:spcBef>
+              <a:spcAft>
+                <a:spcPts val="0"/>
+              </a:spcAft>
+              <a:buSzPts val="2800"/>
+              <a:buNone/>
+              <a:defRPr/>
+            </a:lvl4pPr>
+            <a:lvl5pPr lvl="4">
+              <a:spcBef>
+                <a:spcPts val="0"/>
+              </a:spcBef>
+              <a:spcAft>
+                <a:spcPts val="0"/>
+              </a:spcAft>
+              <a:buSzPts val="2800"/>
+              <a:buNone/>
+              <a:defRPr/>
+            </a:lvl5pPr>
+            <a:lvl6pPr lvl="5">
+              <a:spcBef>
+                <a:spcPts val="0"/>
+              </a:spcBef>
+              <a:spcAft>
+                <a:spcPts val="0"/>
+              </a:spcAft>
+              <a:buSzPts val="2800"/>
+              <a:buNone/>
+              <a:defRPr/>
+            </a:lvl6pPr>
+            <a:lvl7pPr lvl="6">
+              <a:spcBef>
+                <a:spcPts val="0"/>
+              </a:spcBef>
+              <a:spcAft>
+                <a:spcPts val="0"/>
+              </a:spcAft>
+              <a:buSzPts val="2800"/>
+              <a:buNone/>
+              <a:defRPr/>
+            </a:lvl7pPr>
+            <a:lvl8pPr lvl="7">
+              <a:spcBef>
+                <a:spcPts val="0"/>
+              </a:spcBef>
+              <a:spcAft>
+                <a:spcPts val="0"/>
+              </a:spcAft>
+              <a:buSzPts val="2800"/>
+              <a:buNone/>
+              <a:defRPr/>
+            </a:lvl8pPr>
+            <a:lvl9pPr lvl="8">
+              <a:spcBef>
+                <a:spcPts val="0"/>
+              </a:spcBef>
+              <a:spcAft>
+                <a:spcPts val="0"/>
+              </a:spcAft>
+              <a:buSzPts val="2800"/>
+              <a:buNone/>
+              <a:defRPr/>
+            </a:lvl9pPr>
+          </a:lstStyle>
+          <a:p>
+            <a:endParaRPr/>
+          </a:p>
+        </p:txBody>
+      </p:sp>
+      <p:sp>
+        <p:nvSpPr>
+          <p:cNvPr id="22" name="Google Shape;22;p5"/>
+          <p:cNvSpPr txBox="1">
+            <a:spLocks noGrp="1"/>
+          </p:cNvSpPr>
+          <p:nvPr>
+            <p:ph type="body" idx="1"/>
+          </p:nvPr>
+        </p:nvSpPr>
+        <p:spPr>
+          <a:xfrm>
+            <a:off x="415600" y="1536633"/>
+            <a:ext cx="5333200" cy="4555200"/>
+          </a:xfrm>
+          <a:prstGeom prst="rect">
+            <a:avLst/>
+          </a:prstGeom>
+        </p:spPr>
+        <p:txBody>
+          <a:bodyPr spcFirstLastPara="1" wrap="square" lIns="91425" tIns="91425" rIns="91425" bIns="91425" anchor="t" anchorCtr="0"/>
+          <a:lstStyle>
+            <a:lvl1pPr marL="609585" lvl="0" indent="-423323">
+              <a:spcBef>
+                <a:spcPts val="0"/>
+              </a:spcBef>
+              <a:spcAft>
+                <a:spcPts val="0"/>
+              </a:spcAft>
+              <a:buSzPts val="1400"/>
+              <a:buChar char="●"/>
+              <a:defRPr sz="1867"/>
+            </a:lvl1pPr>
+            <a:lvl2pPr marL="1219170" lvl="1" indent="-406390">
+              <a:spcBef>
+                <a:spcPts val="2133"/>
+              </a:spcBef>
+              <a:spcAft>
+                <a:spcPts val="0"/>
+              </a:spcAft>
+              <a:buSzPts val="1200"/>
+              <a:buChar char="○"/>
+              <a:defRPr sz="1600"/>
+            </a:lvl2pPr>
+            <a:lvl3pPr marL="1828754" lvl="2" indent="-406390">
+              <a:spcBef>
+                <a:spcPts val="2133"/>
+              </a:spcBef>
+              <a:spcAft>
+                <a:spcPts val="0"/>
+              </a:spcAft>
+              <a:buSzPts val="1200"/>
+              <a:buChar char="■"/>
+              <a:defRPr sz="1600"/>
+            </a:lvl3pPr>
+            <a:lvl4pPr marL="2438339" lvl="3" indent="-406390">
+              <a:spcBef>
+                <a:spcPts val="2133"/>
+              </a:spcBef>
+              <a:spcAft>
+                <a:spcPts val="0"/>
+              </a:spcAft>
+              <a:buSzPts val="1200"/>
+              <a:buChar char="●"/>
+              <a:defRPr sz="1600"/>
+            </a:lvl4pPr>
+            <a:lvl5pPr marL="3047924" lvl="4" indent="-406390">
+              <a:spcBef>
+                <a:spcPts val="2133"/>
+              </a:spcBef>
+              <a:spcAft>
+                <a:spcPts val="0"/>
+              </a:spcAft>
+              <a:buSzPts val="1200"/>
+              <a:buChar char="○"/>
+              <a:defRPr sz="1600"/>
+            </a:lvl5pPr>
+            <a:lvl6pPr marL="3657509" lvl="5" indent="-406390">
+              <a:spcBef>
+                <a:spcPts val="2133"/>
+              </a:spcBef>
+              <a:spcAft>
+                <a:spcPts val="0"/>
+              </a:spcAft>
+              <a:buSzPts val="1200"/>
+              <a:buChar char="■"/>
+              <a:defRPr sz="1600"/>
+            </a:lvl6pPr>
+            <a:lvl7pPr marL="4267093" lvl="6" indent="-406390">
+              <a:spcBef>
+                <a:spcPts val="2133"/>
+              </a:spcBef>
+              <a:spcAft>
+                <a:spcPts val="0"/>
+              </a:spcAft>
+              <a:buSzPts val="1200"/>
+              <a:buChar char="●"/>
+              <a:defRPr sz="1600"/>
+            </a:lvl7pPr>
+            <a:lvl8pPr marL="4876678" lvl="7" indent="-406390">
+              <a:spcBef>
+                <a:spcPts val="2133"/>
+              </a:spcBef>
+              <a:spcAft>
+                <a:spcPts val="0"/>
+              </a:spcAft>
+              <a:buSzPts val="1200"/>
+              <a:buChar char="○"/>
+              <a:defRPr sz="1600"/>
+            </a:lvl8pPr>
+            <a:lvl9pPr marL="5486263" lvl="8" indent="-406390">
+              <a:spcBef>
+                <a:spcPts val="2133"/>
+              </a:spcBef>
+              <a:spcAft>
+                <a:spcPts val="2133"/>
+              </a:spcAft>
+              <a:buSzPts val="1200"/>
+              <a:buChar char="■"/>
+              <a:defRPr sz="1600"/>
+            </a:lvl9pPr>
+          </a:lstStyle>
+          <a:p>
+            <a:endParaRPr/>
+          </a:p>
+        </p:txBody>
+      </p:sp>
+      <p:sp>
+        <p:nvSpPr>
+          <p:cNvPr id="23" name="Google Shape;23;p5"/>
+          <p:cNvSpPr txBox="1">
+            <a:spLocks noGrp="1"/>
+          </p:cNvSpPr>
+          <p:nvPr>
+            <p:ph type="body" idx="2"/>
+          </p:nvPr>
+        </p:nvSpPr>
+        <p:spPr>
+          <a:xfrm>
+            <a:off x="6443200" y="1536633"/>
+            <a:ext cx="5333200" cy="4555200"/>
+          </a:xfrm>
+          <a:prstGeom prst="rect">
+            <a:avLst/>
+          </a:prstGeom>
+        </p:spPr>
+        <p:txBody>
+          <a:bodyPr spcFirstLastPara="1" wrap="square" lIns="91425" tIns="91425" rIns="91425" bIns="91425" anchor="t" anchorCtr="0"/>
+          <a:lstStyle>
+            <a:lvl1pPr marL="609585" lvl="0" indent="-423323">
+              <a:spcBef>
+                <a:spcPts val="0"/>
+              </a:spcBef>
+              <a:spcAft>
+                <a:spcPts val="0"/>
+              </a:spcAft>
+              <a:buSzPts val="1400"/>
+              <a:buChar char="●"/>
+              <a:defRPr sz="1867"/>
+            </a:lvl1pPr>
+            <a:lvl2pPr marL="1219170" lvl="1" indent="-406390">
+              <a:spcBef>
+                <a:spcPts val="2133"/>
+              </a:spcBef>
+              <a:spcAft>
+                <a:spcPts val="0"/>
+              </a:spcAft>
+              <a:buSzPts val="1200"/>
+              <a:buChar char="○"/>
+              <a:defRPr sz="1600"/>
+            </a:lvl2pPr>
+            <a:lvl3pPr marL="1828754" lvl="2" indent="-406390">
+              <a:spcBef>
+                <a:spcPts val="2133"/>
+              </a:spcBef>
+              <a:spcAft>
+                <a:spcPts val="0"/>
+              </a:spcAft>
+              <a:buSzPts val="1200"/>
+              <a:buChar char="■"/>
+              <a:defRPr sz="1600"/>
+            </a:lvl3pPr>
+            <a:lvl4pPr marL="2438339" lvl="3" indent="-406390">
+              <a:spcBef>
+                <a:spcPts val="2133"/>
+              </a:spcBef>
+              <a:spcAft>
+                <a:spcPts val="0"/>
+              </a:spcAft>
+              <a:buSzPts val="1200"/>
+              <a:buChar char="●"/>
+              <a:defRPr sz="1600"/>
+            </a:lvl4pPr>
+            <a:lvl5pPr marL="3047924" lvl="4" indent="-406390">
+              <a:spcBef>
+                <a:spcPts val="2133"/>
+              </a:spcBef>
+              <a:spcAft>
+                <a:spcPts val="0"/>
+              </a:spcAft>
+              <a:buSzPts val="1200"/>
+              <a:buChar char="○"/>
+              <a:defRPr sz="1600"/>
+            </a:lvl5pPr>
+            <a:lvl6pPr marL="3657509" lvl="5" indent="-406390">
+              <a:spcBef>
+                <a:spcPts val="2133"/>
+              </a:spcBef>
+              <a:spcAft>
+                <a:spcPts val="0"/>
+              </a:spcAft>
+              <a:buSzPts val="1200"/>
+              <a:buChar char="■"/>
+              <a:defRPr sz="1600"/>
+            </a:lvl6pPr>
+            <a:lvl7pPr marL="4267093" lvl="6" indent="-406390">
+              <a:spcBef>
+                <a:spcPts val="2133"/>
+              </a:spcBef>
+              <a:spcAft>
+                <a:spcPts val="0"/>
+              </a:spcAft>
+              <a:buSzPts val="1200"/>
+              <a:buChar char="●"/>
+              <a:defRPr sz="1600"/>
+            </a:lvl7pPr>
+            <a:lvl8pPr marL="4876678" lvl="7" indent="-406390">
+              <a:spcBef>
+                <a:spcPts val="2133"/>
+              </a:spcBef>
+              <a:spcAft>
+                <a:spcPts val="0"/>
+              </a:spcAft>
+              <a:buSzPts val="1200"/>
+              <a:buChar char="○"/>
+              <a:defRPr sz="1600"/>
+            </a:lvl8pPr>
+            <a:lvl9pPr marL="5486263" lvl="8" indent="-406390">
+              <a:spcBef>
+                <a:spcPts val="2133"/>
+              </a:spcBef>
+              <a:spcAft>
+                <a:spcPts val="2133"/>
+              </a:spcAft>
+              <a:buSzPts val="1200"/>
+              <a:buChar char="■"/>
+              <a:defRPr sz="1600"/>
+            </a:lvl9pPr>
+          </a:lstStyle>
+          <a:p>
+            <a:endParaRPr/>
+          </a:p>
+        </p:txBody>
+      </p:sp>
+      <p:sp>
+        <p:nvSpPr>
+          <p:cNvPr id="24" name="Google Shape;24;p5"/>
+          <p:cNvSpPr txBox="1">
+            <a:spLocks noGrp="1"/>
+          </p:cNvSpPr>
+          <p:nvPr>
+            <p:ph type="sldNum" idx="12"/>
+          </p:nvPr>
+        </p:nvSpPr>
+        <p:spPr>
+          <a:xfrm>
+            <a:off x="11296611" y="6217623"/>
+            <a:ext cx="731600" cy="524800"/>
+          </a:xfrm>
+          <a:prstGeom prst="rect">
+            <a:avLst/>
+          </a:prstGeom>
+        </p:spPr>
+        <p:txBody>
+          <a:bodyPr spcFirstLastPara="1" wrap="square" lIns="91425" tIns="91425" rIns="91425" bIns="91425" anchor="ctr" anchorCtr="0">
+            <a:noAutofit/>
+          </a:bodyPr>
+          <a:lstStyle>
+            <a:lvl1pPr lvl="0">
+              <a:buNone/>
+              <a:defRPr/>
+            </a:lvl1pPr>
+            <a:lvl2pPr lvl="1">
+              <a:buNone/>
+              <a:defRPr/>
+            </a:lvl2pPr>
+            <a:lvl3pPr lvl="2">
+              <a:buNone/>
+              <a:defRPr/>
+            </a:lvl3pPr>
+            <a:lvl4pPr lvl="3">
+              <a:buNone/>
+              <a:defRPr/>
+            </a:lvl4pPr>
+            <a:lvl5pPr lvl="4">
+              <a:buNone/>
+              <a:defRPr/>
+            </a:lvl5pPr>
+            <a:lvl6pPr lvl="5">
+              <a:buNone/>
+              <a:defRPr/>
+            </a:lvl6pPr>
+            <a:lvl7pPr lvl="6">
+              <a:buNone/>
+              <a:defRPr/>
+            </a:lvl7pPr>
+            <a:lvl8pPr lvl="7">
+              <a:buNone/>
+              <a:defRPr/>
+            </a:lvl8pPr>
+            <a:lvl9pPr lvl="8">
+              <a:buNone/>
+              <a:defRPr/>
+            </a:lvl9pPr>
+          </a:lstStyle>
+          <a:p>
+            <a:fld id="{00000000-1234-1234-1234-123412341234}" type="slidenum">
+              <a:rPr lang="en" smtClean="0"/>
+              <a:pPr/>
+              <a:t>‹#›</a:t>
+            </a:fld>
+            <a:endParaRPr lang="en"/>
+          </a:p>
+        </p:txBody>
+      </p:sp>
+    </p:spTree>
+    <p:extLst>
+      <p:ext uri="{BB962C8B-B14F-4D97-AF65-F5344CB8AC3E}">
+        <p14:creationId xmlns:p14="http://schemas.microsoft.com/office/powerpoint/2010/main" val="1310239341"/>
+      </p:ext>
+    </p:extLst>
+  </p:cSld>
+  <p:clrMapOvr>
+    <a:masterClrMapping/>
+  </p:clrMapOvr>
+</p:sldLayout>
+</file>
+
+<file path=ppt/slideLayouts/slideLayout13.xml><?xml version="1.0" encoding="utf-8"?>
+<p:sldLayout xmlns:a="http://schemas.openxmlformats.org/drawingml/2006/main" xmlns:r="http://schemas.openxmlformats.org/officeDocument/2006/relationships" xmlns:p="http://schemas.openxmlformats.org/presentationml/2006/main" matchingName="Section header" type="secHead">
+  <p:cSld name="1_Section header">
+    <p:spTree>
+      <p:nvGrpSpPr>
+        <p:cNvPr id="1" name="Shape 13"/>
+        <p:cNvGrpSpPr/>
+        <p:nvPr/>
+      </p:nvGrpSpPr>
+      <p:grpSpPr>
+        <a:xfrm>
+          <a:off x="0" y="0"/>
+          <a:ext cx="0" cy="0"/>
+          <a:chOff x="0" y="0"/>
+          <a:chExt cx="0" cy="0"/>
+        </a:xfrm>
+      </p:grpSpPr>
+      <p:sp>
+        <p:nvSpPr>
+          <p:cNvPr id="14" name="Google Shape;14;p3"/>
+          <p:cNvSpPr txBox="1">
+            <a:spLocks noGrp="1"/>
+          </p:cNvSpPr>
+          <p:nvPr>
+            <p:ph type="title"/>
+          </p:nvPr>
+        </p:nvSpPr>
+        <p:spPr>
+          <a:xfrm>
+            <a:off x="415600" y="2867800"/>
+            <a:ext cx="11360800" cy="1122400"/>
+          </a:xfrm>
+          <a:prstGeom prst="rect">
+            <a:avLst/>
+          </a:prstGeom>
+        </p:spPr>
+        <p:txBody>
+          <a:bodyPr spcFirstLastPara="1" wrap="square" lIns="91425" tIns="91425" rIns="91425" bIns="91425" anchor="ctr" anchorCtr="0"/>
+          <a:lstStyle>
+            <a:lvl1pPr lvl="0" algn="ctr">
+              <a:spcBef>
+                <a:spcPts val="0"/>
+              </a:spcBef>
+              <a:spcAft>
+                <a:spcPts val="0"/>
+              </a:spcAft>
+              <a:buSzPts val="3600"/>
+              <a:buNone/>
+              <a:defRPr sz="4800"/>
+            </a:lvl1pPr>
+            <a:lvl2pPr lvl="1" algn="ctr">
+              <a:spcBef>
+                <a:spcPts val="0"/>
+              </a:spcBef>
+              <a:spcAft>
+                <a:spcPts val="0"/>
+              </a:spcAft>
+              <a:buSzPts val="3600"/>
+              <a:buNone/>
+              <a:defRPr sz="4800"/>
+            </a:lvl2pPr>
+            <a:lvl3pPr lvl="2" algn="ctr">
+              <a:spcBef>
+                <a:spcPts val="0"/>
+              </a:spcBef>
+              <a:spcAft>
+                <a:spcPts val="0"/>
+              </a:spcAft>
+              <a:buSzPts val="3600"/>
+              <a:buNone/>
+              <a:defRPr sz="4800"/>
+            </a:lvl3pPr>
+            <a:lvl4pPr lvl="3" algn="ctr">
+              <a:spcBef>
+                <a:spcPts val="0"/>
+              </a:spcBef>
+              <a:spcAft>
+                <a:spcPts val="0"/>
+              </a:spcAft>
+              <a:buSzPts val="3600"/>
+              <a:buNone/>
+              <a:defRPr sz="4800"/>
+            </a:lvl4pPr>
+            <a:lvl5pPr lvl="4" algn="ctr">
+              <a:spcBef>
+                <a:spcPts val="0"/>
+              </a:spcBef>
+              <a:spcAft>
+                <a:spcPts val="0"/>
+              </a:spcAft>
+              <a:buSzPts val="3600"/>
+              <a:buNone/>
+              <a:defRPr sz="4800"/>
+            </a:lvl5pPr>
+            <a:lvl6pPr lvl="5" algn="ctr">
+              <a:spcBef>
+                <a:spcPts val="0"/>
+              </a:spcBef>
+              <a:spcAft>
+                <a:spcPts val="0"/>
+              </a:spcAft>
+              <a:buSzPts val="3600"/>
+              <a:buNone/>
+              <a:defRPr sz="4800"/>
+            </a:lvl6pPr>
+            <a:lvl7pPr lvl="6" algn="ctr">
+              <a:spcBef>
+                <a:spcPts val="0"/>
+              </a:spcBef>
+              <a:spcAft>
+                <a:spcPts val="0"/>
+              </a:spcAft>
+              <a:buSzPts val="3600"/>
+              <a:buNone/>
+              <a:defRPr sz="4800"/>
+            </a:lvl7pPr>
+            <a:lvl8pPr lvl="7" algn="ctr">
+              <a:spcBef>
+                <a:spcPts val="0"/>
+              </a:spcBef>
+              <a:spcAft>
+                <a:spcPts val="0"/>
+              </a:spcAft>
+              <a:buSzPts val="3600"/>
+              <a:buNone/>
+              <a:defRPr sz="4800"/>
+            </a:lvl8pPr>
+            <a:lvl9pPr lvl="8" algn="ctr">
+              <a:spcBef>
+                <a:spcPts val="0"/>
+              </a:spcBef>
+              <a:spcAft>
+                <a:spcPts val="0"/>
+              </a:spcAft>
+              <a:buSzPts val="3600"/>
+              <a:buNone/>
+              <a:defRPr sz="4800"/>
+            </a:lvl9pPr>
+          </a:lstStyle>
+          <a:p>
+            <a:endParaRPr/>
+          </a:p>
+        </p:txBody>
+      </p:sp>
+      <p:sp>
+        <p:nvSpPr>
+          <p:cNvPr id="15" name="Google Shape;15;p3"/>
+          <p:cNvSpPr txBox="1">
+            <a:spLocks noGrp="1"/>
+          </p:cNvSpPr>
+          <p:nvPr>
+            <p:ph type="sldNum" idx="12"/>
+          </p:nvPr>
+        </p:nvSpPr>
+        <p:spPr>
+          <a:xfrm>
+            <a:off x="11296611" y="6217623"/>
+            <a:ext cx="731600" cy="524800"/>
+          </a:xfrm>
+          <a:prstGeom prst="rect">
+            <a:avLst/>
+          </a:prstGeom>
+        </p:spPr>
+        <p:txBody>
+          <a:bodyPr spcFirstLastPara="1" wrap="square" lIns="91425" tIns="91425" rIns="91425" bIns="91425" anchor="ctr" anchorCtr="0">
+            <a:noAutofit/>
+          </a:bodyPr>
+          <a:lstStyle>
+            <a:lvl1pPr lvl="0">
+              <a:buNone/>
+              <a:defRPr/>
+            </a:lvl1pPr>
+            <a:lvl2pPr lvl="1">
+              <a:buNone/>
+              <a:defRPr/>
+            </a:lvl2pPr>
+            <a:lvl3pPr lvl="2">
+              <a:buNone/>
+              <a:defRPr/>
+            </a:lvl3pPr>
+            <a:lvl4pPr lvl="3">
+              <a:buNone/>
+              <a:defRPr/>
+            </a:lvl4pPr>
+            <a:lvl5pPr lvl="4">
+              <a:buNone/>
+              <a:defRPr/>
+            </a:lvl5pPr>
+            <a:lvl6pPr lvl="5">
+              <a:buNone/>
+              <a:defRPr/>
+            </a:lvl6pPr>
+            <a:lvl7pPr lvl="6">
+              <a:buNone/>
+              <a:defRPr/>
+            </a:lvl7pPr>
+            <a:lvl8pPr lvl="7">
+              <a:buNone/>
+              <a:defRPr/>
+            </a:lvl8pPr>
+            <a:lvl9pPr lvl="8">
+              <a:buNone/>
+              <a:defRPr/>
+            </a:lvl9pPr>
+          </a:lstStyle>
+          <a:p>
+            <a:fld id="{00000000-1234-1234-1234-123412341234}" type="slidenum">
+              <a:rPr lang="en" smtClean="0"/>
+              <a:pPr/>
+              <a:t>‹#›</a:t>
+            </a:fld>
+            <a:endParaRPr lang="en"/>
+          </a:p>
+        </p:txBody>
+      </p:sp>
+    </p:spTree>
+    <p:extLst>
+      <p:ext uri="{BB962C8B-B14F-4D97-AF65-F5344CB8AC3E}">
+        <p14:creationId xmlns:p14="http://schemas.microsoft.com/office/powerpoint/2010/main" val="2403827732"/>
       </p:ext>
     </p:extLst>
   </p:cSld>
@@ -3060,6 +4439,8 @@
     <p:sldLayoutId id="2147483657" r:id="rId9"/>
     <p:sldLayoutId id="2147483658" r:id="rId10"/>
     <p:sldLayoutId id="2147483659" r:id="rId11"/>
+    <p:sldLayoutId id="2147483660" r:id="rId12"/>
+    <p:sldLayoutId id="2147483661" r:id="rId13"/>
   </p:sldLayoutIdLst>
   <p:txStyles>
     <p:titleStyle>
@@ -3407,6 +4788,178 @@
 </p:sld>
 </file>
 
+<file path=ppt/slides/slide10.xml><?xml version="1.0" encoding="utf-8"?>
+<p:sld xmlns:a="http://schemas.openxmlformats.org/drawingml/2006/main" xmlns:r="http://schemas.openxmlformats.org/officeDocument/2006/relationships" xmlns:p="http://schemas.openxmlformats.org/presentationml/2006/main">
+  <p:cSld>
+    <p:spTree>
+      <p:nvGrpSpPr>
+        <p:cNvPr id="1" name="Shape 66"/>
+        <p:cNvGrpSpPr/>
+        <p:nvPr/>
+      </p:nvGrpSpPr>
+      <p:grpSpPr>
+        <a:xfrm>
+          <a:off x="0" y="0"/>
+          <a:ext cx="0" cy="0"/>
+          <a:chOff x="0" y="0"/>
+          <a:chExt cx="0" cy="0"/>
+        </a:xfrm>
+      </p:grpSpPr>
+      <p:pic>
+        <p:nvPicPr>
+          <p:cNvPr id="67" name="Google Shape;67;p15"/>
+          <p:cNvPicPr preferRelativeResize="0"/>
+          <p:nvPr/>
+        </p:nvPicPr>
+        <p:blipFill>
+          <a:blip r:embed="rId3">
+            <a:alphaModFix/>
+          </a:blip>
+          <a:stretch>
+            <a:fillRect/>
+          </a:stretch>
+        </p:blipFill>
+        <p:spPr>
+          <a:xfrm>
+            <a:off x="5785834" y="1577501"/>
+            <a:ext cx="5974933" cy="4891767"/>
+          </a:xfrm>
+          <a:prstGeom prst="rect">
+            <a:avLst/>
+          </a:prstGeom>
+          <a:noFill/>
+          <a:ln>
+            <a:noFill/>
+          </a:ln>
+        </p:spPr>
+      </p:pic>
+      <p:pic>
+        <p:nvPicPr>
+          <p:cNvPr id="68" name="Google Shape;68;p15"/>
+          <p:cNvPicPr preferRelativeResize="0"/>
+          <p:nvPr/>
+        </p:nvPicPr>
+        <p:blipFill>
+          <a:blip r:embed="rId4">
+            <a:alphaModFix/>
+          </a:blip>
+          <a:stretch>
+            <a:fillRect/>
+          </a:stretch>
+        </p:blipFill>
+        <p:spPr>
+          <a:xfrm>
+            <a:off x="620000" y="2186317"/>
+            <a:ext cx="4856235" cy="3267747"/>
+          </a:xfrm>
+          <a:prstGeom prst="rect">
+            <a:avLst/>
+          </a:prstGeom>
+          <a:noFill/>
+          <a:ln>
+            <a:noFill/>
+          </a:ln>
+        </p:spPr>
+      </p:pic>
+      <p:sp>
+        <p:nvSpPr>
+          <p:cNvPr id="69" name="Google Shape;69;p15"/>
+          <p:cNvSpPr txBox="1">
+            <a:spLocks noGrp="1"/>
+          </p:cNvSpPr>
+          <p:nvPr>
+            <p:ph type="title"/>
+          </p:nvPr>
+        </p:nvSpPr>
+        <p:spPr>
+          <a:xfrm>
+            <a:off x="286567" y="207967"/>
+            <a:ext cx="11360800" cy="1122400"/>
+          </a:xfrm>
+          <a:prstGeom prst="rect">
+            <a:avLst/>
+          </a:prstGeom>
+        </p:spPr>
+        <p:txBody>
+          <a:bodyPr spcFirstLastPara="1" vert="horz" wrap="square" lIns="121900" tIns="121900" rIns="121900" bIns="121900" rtlCol="0" anchor="ctr" anchorCtr="0">
+            <a:noAutofit/>
+          </a:bodyPr>
+          <a:lstStyle/>
+          <a:p>
+            <a:r>
+              <a:rPr lang="en"/>
+              <a:t>Flask code</a:t>
+            </a:r>
+            <a:endParaRPr/>
+          </a:p>
+        </p:txBody>
+      </p:sp>
+    </p:spTree>
+  </p:cSld>
+  <p:clrMapOvr>
+    <a:masterClrMapping/>
+  </p:clrMapOvr>
+</p:sld>
+</file>
+
+<file path=ppt/slides/slide11.xml><?xml version="1.0" encoding="utf-8"?>
+<p:sld xmlns:a="http://schemas.openxmlformats.org/drawingml/2006/main" xmlns:r="http://schemas.openxmlformats.org/officeDocument/2006/relationships" xmlns:p="http://schemas.openxmlformats.org/presentationml/2006/main">
+  <p:cSld>
+    <p:spTree>
+      <p:nvGrpSpPr>
+        <p:cNvPr id="1" name=""/>
+        <p:cNvGrpSpPr/>
+        <p:nvPr/>
+      </p:nvGrpSpPr>
+      <p:grpSpPr>
+        <a:xfrm>
+          <a:off x="0" y="0"/>
+          <a:ext cx="0" cy="0"/>
+          <a:chOff x="0" y="0"/>
+          <a:chExt cx="0" cy="0"/>
+        </a:xfrm>
+      </p:grpSpPr>
+      <p:sp>
+        <p:nvSpPr>
+          <p:cNvPr id="2" name="Title 1">
+            <a:extLst>
+              <a:ext uri="{FF2B5EF4-FFF2-40B4-BE49-F238E27FC236}">
+                <a16:creationId xmlns:a16="http://schemas.microsoft.com/office/drawing/2014/main" id="{E2F3B982-5651-45E3-9447-4D1E99E79B66}"/>
+              </a:ext>
+            </a:extLst>
+          </p:cNvPr>
+          <p:cNvSpPr>
+            <a:spLocks noGrp="1"/>
+          </p:cNvSpPr>
+          <p:nvPr>
+            <p:ph type="title"/>
+          </p:nvPr>
+        </p:nvSpPr>
+        <p:spPr/>
+        <p:txBody>
+          <a:bodyPr/>
+          <a:lstStyle/>
+          <a:p>
+            <a:r>
+              <a:rPr lang="en-US" dirty="0"/>
+              <a:t>Questions?</a:t>
+            </a:r>
+          </a:p>
+        </p:txBody>
+      </p:sp>
+    </p:spTree>
+    <p:extLst>
+      <p:ext uri="{BB962C8B-B14F-4D97-AF65-F5344CB8AC3E}">
+        <p14:creationId xmlns:p14="http://schemas.microsoft.com/office/powerpoint/2010/main" val="4131625262"/>
+      </p:ext>
+    </p:extLst>
+  </p:cSld>
+  <p:clrMapOvr>
+    <a:masterClrMapping/>
+  </p:clrMapOvr>
+</p:sld>
+</file>
+
 <file path=ppt/slides/slide2.xml><?xml version="1.0" encoding="utf-8"?>
 <p:sld xmlns:a="http://schemas.openxmlformats.org/drawingml/2006/main" xmlns:r="http://schemas.openxmlformats.org/officeDocument/2006/relationships" xmlns:p="http://schemas.openxmlformats.org/presentationml/2006/main">
   <p:cSld>
@@ -4404,6 +5957,387 @@
         <p14:creationId xmlns:p14="http://schemas.microsoft.com/office/powerpoint/2010/main" val="3842725657"/>
       </p:ext>
     </p:extLst>
+  </p:cSld>
+  <p:clrMapOvr>
+    <a:masterClrMapping/>
+  </p:clrMapOvr>
+</p:sld>
+</file>
+
+<file path=ppt/slides/slide7.xml><?xml version="1.0" encoding="utf-8"?>
+<p:sld xmlns:a="http://schemas.openxmlformats.org/drawingml/2006/main" xmlns:r="http://schemas.openxmlformats.org/officeDocument/2006/relationships" xmlns:p="http://schemas.openxmlformats.org/presentationml/2006/main">
+  <p:cSld>
+    <p:spTree>
+      <p:nvGrpSpPr>
+        <p:cNvPr id="1" name=""/>
+        <p:cNvGrpSpPr/>
+        <p:nvPr/>
+      </p:nvGrpSpPr>
+      <p:grpSpPr>
+        <a:xfrm>
+          <a:off x="0" y="0"/>
+          <a:ext cx="0" cy="0"/>
+          <a:chOff x="0" y="0"/>
+          <a:chExt cx="0" cy="0"/>
+        </a:xfrm>
+      </p:grpSpPr>
+      <p:sp>
+        <p:nvSpPr>
+          <p:cNvPr id="2" name="Title 1">
+            <a:extLst>
+              <a:ext uri="{FF2B5EF4-FFF2-40B4-BE49-F238E27FC236}">
+                <a16:creationId xmlns:a16="http://schemas.microsoft.com/office/drawing/2014/main" id="{9F9D15BF-A164-4E20-971F-747104E52010}"/>
+              </a:ext>
+            </a:extLst>
+          </p:cNvPr>
+          <p:cNvSpPr>
+            <a:spLocks noGrp="1"/>
+          </p:cNvSpPr>
+          <p:nvPr>
+            <p:ph type="title"/>
+          </p:nvPr>
+        </p:nvSpPr>
+        <p:spPr>
+          <a:xfrm>
+            <a:off x="942475" y="280192"/>
+            <a:ext cx="10515600" cy="1325563"/>
+          </a:xfrm>
+        </p:spPr>
+        <p:txBody>
+          <a:bodyPr>
+            <a:normAutofit/>
+          </a:bodyPr>
+          <a:lstStyle/>
+          <a:p>
+            <a:pPr algn="ctr"/>
+            <a:r>
+              <a:rPr lang="en-US" sz="3600" dirty="0"/>
+              <a:t>AUC – Visualization of true/false positive rates at different probability </a:t>
+            </a:r>
+            <a:r>
+              <a:rPr lang="en-US" sz="3600" dirty="0" err="1"/>
+              <a:t>threshholds</a:t>
+            </a:r>
+            <a:endParaRPr lang="en-US" sz="3600" dirty="0"/>
+          </a:p>
+        </p:txBody>
+      </p:sp>
+      <p:pic>
+        <p:nvPicPr>
+          <p:cNvPr id="4" name="Picture 3">
+            <a:extLst>
+              <a:ext uri="{FF2B5EF4-FFF2-40B4-BE49-F238E27FC236}">
+                <a16:creationId xmlns:a16="http://schemas.microsoft.com/office/drawing/2014/main" id="{A2C4BF15-E8CB-4D92-83B2-456309C13558}"/>
+              </a:ext>
+            </a:extLst>
+          </p:cNvPr>
+          <p:cNvPicPr>
+            <a:picLocks noChangeAspect="1"/>
+          </p:cNvPicPr>
+          <p:nvPr/>
+        </p:nvPicPr>
+        <p:blipFill>
+          <a:blip r:embed="rId2"/>
+          <a:stretch>
+            <a:fillRect/>
+          </a:stretch>
+        </p:blipFill>
+        <p:spPr>
+          <a:xfrm>
+            <a:off x="285820" y="1678657"/>
+            <a:ext cx="11492023" cy="4116054"/>
+          </a:xfrm>
+          <a:prstGeom prst="rect">
+            <a:avLst/>
+          </a:prstGeom>
+        </p:spPr>
+      </p:pic>
+      <p:sp>
+        <p:nvSpPr>
+          <p:cNvPr id="5" name="TextBox 4">
+            <a:extLst>
+              <a:ext uri="{FF2B5EF4-FFF2-40B4-BE49-F238E27FC236}">
+                <a16:creationId xmlns:a16="http://schemas.microsoft.com/office/drawing/2014/main" id="{01A600DE-EDE1-4A30-9E9F-DDF9245923E0}"/>
+              </a:ext>
+            </a:extLst>
+          </p:cNvPr>
+          <p:cNvSpPr txBox="1"/>
+          <p:nvPr/>
+        </p:nvSpPr>
+        <p:spPr>
+          <a:xfrm>
+            <a:off x="157483" y="5991726"/>
+            <a:ext cx="10891636" cy="646331"/>
+          </a:xfrm>
+          <a:prstGeom prst="rect">
+            <a:avLst/>
+          </a:prstGeom>
+          <a:noFill/>
+        </p:spPr>
+        <p:txBody>
+          <a:bodyPr wrap="none" rtlCol="0">
+            <a:spAutoFit/>
+          </a:bodyPr>
+          <a:lstStyle/>
+          <a:p>
+            <a:r>
+              <a:rPr lang="en-US" dirty="0"/>
+              <a:t> - Decision about who to target for a possible readmission reduction plan will depend on various factors, including:</a:t>
+            </a:r>
+          </a:p>
+          <a:p>
+            <a:r>
+              <a:rPr lang="en-US" dirty="0"/>
+              <a:t>	Resource availability, balance of true/false positives, possible downstream benefits</a:t>
+            </a:r>
+          </a:p>
+        </p:txBody>
+      </p:sp>
+    </p:spTree>
+    <p:extLst>
+      <p:ext uri="{BB962C8B-B14F-4D97-AF65-F5344CB8AC3E}">
+        <p14:creationId xmlns:p14="http://schemas.microsoft.com/office/powerpoint/2010/main" val="3793981752"/>
+      </p:ext>
+    </p:extLst>
+  </p:cSld>
+  <p:clrMapOvr>
+    <a:masterClrMapping/>
+  </p:clrMapOvr>
+</p:sld>
+</file>
+
+<file path=ppt/slides/slide8.xml><?xml version="1.0" encoding="utf-8"?>
+<p:sld xmlns:a="http://schemas.openxmlformats.org/drawingml/2006/main" xmlns:r="http://schemas.openxmlformats.org/officeDocument/2006/relationships" xmlns:p="http://schemas.openxmlformats.org/presentationml/2006/main">
+  <p:cSld>
+    <p:spTree>
+      <p:nvGrpSpPr>
+        <p:cNvPr id="1" name="Shape 53"/>
+        <p:cNvGrpSpPr/>
+        <p:nvPr/>
+      </p:nvGrpSpPr>
+      <p:grpSpPr>
+        <a:xfrm>
+          <a:off x="0" y="0"/>
+          <a:ext cx="0" cy="0"/>
+          <a:chOff x="0" y="0"/>
+          <a:chExt cx="0" cy="0"/>
+        </a:xfrm>
+      </p:grpSpPr>
+      <p:sp>
+        <p:nvSpPr>
+          <p:cNvPr id="54" name="Google Shape;54;p13"/>
+          <p:cNvSpPr txBox="1">
+            <a:spLocks noGrp="1"/>
+          </p:cNvSpPr>
+          <p:nvPr>
+            <p:ph type="ctrTitle"/>
+          </p:nvPr>
+        </p:nvSpPr>
+        <p:spPr>
+          <a:xfrm>
+            <a:off x="415611" y="992767"/>
+            <a:ext cx="11360800" cy="2736800"/>
+          </a:xfrm>
+          <a:prstGeom prst="rect">
+            <a:avLst/>
+          </a:prstGeom>
+        </p:spPr>
+        <p:txBody>
+          <a:bodyPr spcFirstLastPara="1" vert="horz" wrap="square" lIns="121900" tIns="121900" rIns="121900" bIns="121900" rtlCol="0" anchor="b" anchorCtr="0">
+            <a:noAutofit/>
+          </a:bodyPr>
+          <a:lstStyle/>
+          <a:p>
+            <a:pPr>
+              <a:spcBef>
+                <a:spcPts val="0"/>
+              </a:spcBef>
+            </a:pPr>
+            <a:r>
+              <a:rPr lang="en" dirty="0"/>
+              <a:t>Flask </a:t>
+            </a:r>
+            <a:r>
+              <a:rPr lang="en-US" dirty="0"/>
+              <a:t>Pipeline</a:t>
+            </a:r>
+            <a:endParaRPr dirty="0"/>
+          </a:p>
+        </p:txBody>
+      </p:sp>
+      <p:sp>
+        <p:nvSpPr>
+          <p:cNvPr id="55" name="Google Shape;55;p13"/>
+          <p:cNvSpPr txBox="1">
+            <a:spLocks noGrp="1"/>
+          </p:cNvSpPr>
+          <p:nvPr>
+            <p:ph type="subTitle" idx="1"/>
+          </p:nvPr>
+        </p:nvSpPr>
+        <p:spPr>
+          <a:xfrm>
+            <a:off x="415600" y="3778833"/>
+            <a:ext cx="11360800" cy="1056800"/>
+          </a:xfrm>
+          <a:prstGeom prst="rect">
+            <a:avLst/>
+          </a:prstGeom>
+        </p:spPr>
+        <p:txBody>
+          <a:bodyPr spcFirstLastPara="1" vert="horz" wrap="square" lIns="121900" tIns="121900" rIns="121900" bIns="121900" rtlCol="0" anchor="t" anchorCtr="0">
+            <a:noAutofit/>
+          </a:bodyPr>
+          <a:lstStyle/>
+          <a:p>
+            <a:pPr>
+              <a:spcBef>
+                <a:spcPts val="0"/>
+              </a:spcBef>
+            </a:pPr>
+            <a:endParaRPr/>
+          </a:p>
+        </p:txBody>
+      </p:sp>
+    </p:spTree>
+  </p:cSld>
+  <p:clrMapOvr>
+    <a:masterClrMapping/>
+  </p:clrMapOvr>
+</p:sld>
+</file>
+
+<file path=ppt/slides/slide9.xml><?xml version="1.0" encoding="utf-8"?>
+<p:sld xmlns:a="http://schemas.openxmlformats.org/drawingml/2006/main" xmlns:r="http://schemas.openxmlformats.org/officeDocument/2006/relationships" xmlns:p="http://schemas.openxmlformats.org/presentationml/2006/main">
+  <p:cSld>
+    <p:spTree>
+      <p:nvGrpSpPr>
+        <p:cNvPr id="1" name="Shape 59"/>
+        <p:cNvGrpSpPr/>
+        <p:nvPr/>
+      </p:nvGrpSpPr>
+      <p:grpSpPr>
+        <a:xfrm>
+          <a:off x="0" y="0"/>
+          <a:ext cx="0" cy="0"/>
+          <a:chOff x="0" y="0"/>
+          <a:chExt cx="0" cy="0"/>
+        </a:xfrm>
+      </p:grpSpPr>
+      <p:sp>
+        <p:nvSpPr>
+          <p:cNvPr id="60" name="Google Shape;60;p14"/>
+          <p:cNvSpPr txBox="1">
+            <a:spLocks noGrp="1"/>
+          </p:cNvSpPr>
+          <p:nvPr>
+            <p:ph type="title"/>
+          </p:nvPr>
+        </p:nvSpPr>
+        <p:spPr>
+          <a:xfrm>
+            <a:off x="415600" y="593367"/>
+            <a:ext cx="11360800" cy="763600"/>
+          </a:xfrm>
+          <a:prstGeom prst="rect">
+            <a:avLst/>
+          </a:prstGeom>
+        </p:spPr>
+        <p:txBody>
+          <a:bodyPr spcFirstLastPara="1" vert="horz" wrap="square" lIns="121900" tIns="121900" rIns="121900" bIns="121900" rtlCol="0" anchor="t" anchorCtr="0">
+            <a:noAutofit/>
+          </a:bodyPr>
+          <a:lstStyle/>
+          <a:p>
+            <a:r>
+              <a:rPr lang="en"/>
+              <a:t>Pipeline</a:t>
+            </a:r>
+            <a:endParaRPr/>
+          </a:p>
+        </p:txBody>
+      </p:sp>
+      <p:sp>
+        <p:nvSpPr>
+          <p:cNvPr id="61" name="Google Shape;61;p14"/>
+          <p:cNvSpPr txBox="1">
+            <a:spLocks noGrp="1"/>
+          </p:cNvSpPr>
+          <p:nvPr>
+            <p:ph type="body" idx="1"/>
+          </p:nvPr>
+        </p:nvSpPr>
+        <p:spPr>
+          <a:xfrm>
+            <a:off x="415600" y="1536633"/>
+            <a:ext cx="5333200" cy="4555200"/>
+          </a:xfrm>
+          <a:prstGeom prst="rect">
+            <a:avLst/>
+          </a:prstGeom>
+        </p:spPr>
+        <p:txBody>
+          <a:bodyPr spcFirstLastPara="1" vert="horz" wrap="square" lIns="121900" tIns="121900" rIns="121900" bIns="121900" rtlCol="0" anchor="t" anchorCtr="0">
+            <a:noAutofit/>
+          </a:bodyPr>
+          <a:lstStyle/>
+          <a:p>
+            <a:pPr indent="-457189">
+              <a:buSzPts val="1800"/>
+            </a:pPr>
+            <a:r>
+              <a:rPr lang="en" sz="2400"/>
+              <a:t>Input: a csv file with patient information</a:t>
+            </a:r>
+            <a:endParaRPr sz="2400"/>
+          </a:p>
+          <a:p>
+            <a:pPr indent="-457189">
+              <a:spcBef>
+                <a:spcPts val="1333"/>
+              </a:spcBef>
+              <a:spcAft>
+                <a:spcPts val="1333"/>
+              </a:spcAft>
+              <a:buSzPts val="1800"/>
+            </a:pPr>
+            <a:r>
+              <a:rPr lang="en" sz="2400"/>
+              <a:t>Output: the same csv file with the predictions for each patient and probability of patient being readmitted according to stacked model</a:t>
+            </a:r>
+            <a:endParaRPr sz="2400"/>
+          </a:p>
+        </p:txBody>
+      </p:sp>
+      <p:pic>
+        <p:nvPicPr>
+          <p:cNvPr id="62" name="Google Shape;62;p14"/>
+          <p:cNvPicPr preferRelativeResize="0"/>
+          <p:nvPr/>
+        </p:nvPicPr>
+        <p:blipFill>
+          <a:blip r:embed="rId3">
+            <a:alphaModFix/>
+          </a:blip>
+          <a:stretch>
+            <a:fillRect/>
+          </a:stretch>
+        </p:blipFill>
+        <p:spPr>
+          <a:xfrm>
+            <a:off x="5746467" y="1536634"/>
+            <a:ext cx="6036800" cy="3700861"/>
+          </a:xfrm>
+          <a:prstGeom prst="rect">
+            <a:avLst/>
+          </a:prstGeom>
+          <a:noFill/>
+          <a:ln>
+            <a:noFill/>
+          </a:ln>
+        </p:spPr>
+      </p:pic>
+    </p:spTree>
   </p:cSld>
   <p:clrMapOvr>
     <a:masterClrMapping/>
@@ -4704,4 +6638,299 @@
     </a:ext>
   </a:extLst>
 </a:theme>
+</file>
+
+<file path=ppt/theme/theme2.xml><?xml version="1.0" encoding="utf-8"?>
+<a:theme xmlns:a="http://schemas.openxmlformats.org/drawingml/2006/main" name="Office Theme">
+  <a:themeElements>
+    <a:clrScheme name="Office">
+      <a:dk1>
+        <a:sysClr val="windowText" lastClr="000000"/>
+      </a:dk1>
+      <a:lt1>
+        <a:sysClr val="window" lastClr="FFFFFF"/>
+      </a:lt1>
+      <a:dk2>
+        <a:srgbClr val="44546A"/>
+      </a:dk2>
+      <a:lt2>
+        <a:srgbClr val="E7E6E6"/>
+      </a:lt2>
+      <a:accent1>
+        <a:srgbClr val="4472C4"/>
+      </a:accent1>
+      <a:accent2>
+        <a:srgbClr val="ED7D31"/>
+      </a:accent2>
+      <a:accent3>
+        <a:srgbClr val="A5A5A5"/>
+      </a:accent3>
+      <a:accent4>
+        <a:srgbClr val="FFC000"/>
+      </a:accent4>
+      <a:accent5>
+        <a:srgbClr val="5B9BD5"/>
+      </a:accent5>
+      <a:accent6>
+        <a:srgbClr val="70AD47"/>
+      </a:accent6>
+      <a:hlink>
+        <a:srgbClr val="0563C1"/>
+      </a:hlink>
+      <a:folHlink>
+        <a:srgbClr val="954F72"/>
+      </a:folHlink>
+    </a:clrScheme>
+    <a:fontScheme name="Office">
+      <a:majorFont>
+        <a:latin typeface="Calibri Light" panose="020F0302020204030204"/>
+        <a:ea typeface=""/>
+        <a:cs typeface=""/>
+        <a:font script="Jpan" typeface="游ゴシック Light"/>
+        <a:font script="Hang" typeface="맑은 고딕"/>
+        <a:font script="Hans" typeface="等线 Light"/>
+        <a:font script="Hant" typeface="新細明體"/>
+        <a:font script="Arab" typeface="Times New Roman"/>
+        <a:font script="Hebr" typeface="Times New Roman"/>
+        <a:font script="Thai" typeface="Angsana New"/>
+        <a:font script="Ethi" typeface="Nyala"/>
+        <a:font script="Beng" typeface="Vrinda"/>
+        <a:font script="Gujr" typeface="Shruti"/>
+        <a:font script="Khmr" typeface="MoolBoran"/>
+        <a:font script="Knda" typeface="Tunga"/>
+        <a:font script="Guru" typeface="Raavi"/>
+        <a:font script="Cans" typeface="Euphemia"/>
+        <a:font script="Cher" typeface="Plantagenet Cherokee"/>
+        <a:font script="Yiii" typeface="Microsoft Yi Baiti"/>
+        <a:font script="Tibt" typeface="Microsoft Himalaya"/>
+        <a:font script="Thaa" typeface="MV Boli"/>
+        <a:font script="Deva" typeface="Mangal"/>
+        <a:font script="Telu" typeface="Gautami"/>
+        <a:font script="Taml" typeface="Latha"/>
+        <a:font script="Syrc" typeface="Estrangelo Edessa"/>
+        <a:font script="Orya" typeface="Kalinga"/>
+        <a:font script="Mlym" typeface="Kartika"/>
+        <a:font script="Laoo" typeface="DokChampa"/>
+        <a:font script="Sinh" typeface="Iskoola Pota"/>
+        <a:font script="Mong" typeface="Mongolian Baiti"/>
+        <a:font script="Viet" typeface="Times New Roman"/>
+        <a:font script="Uigh" typeface="Microsoft Uighur"/>
+        <a:font script="Geor" typeface="Sylfaen"/>
+        <a:font script="Armn" typeface="Arial"/>
+        <a:font script="Bugi" typeface="Leelawadee UI"/>
+        <a:font script="Bopo" typeface="Microsoft JhengHei"/>
+        <a:font script="Java" typeface="Javanese Text"/>
+        <a:font script="Lisu" typeface="Segoe UI"/>
+        <a:font script="Mymr" typeface="Myanmar Text"/>
+        <a:font script="Nkoo" typeface="Ebrima"/>
+        <a:font script="Olck" typeface="Nirmala UI"/>
+        <a:font script="Osma" typeface="Ebrima"/>
+        <a:font script="Phag" typeface="Phagspa"/>
+        <a:font script="Syrn" typeface="Estrangelo Edessa"/>
+        <a:font script="Syrj" typeface="Estrangelo Edessa"/>
+        <a:font script="Syre" typeface="Estrangelo Edessa"/>
+        <a:font script="Sora" typeface="Nirmala UI"/>
+        <a:font script="Tale" typeface="Microsoft Tai Le"/>
+        <a:font script="Talu" typeface="Microsoft New Tai Lue"/>
+        <a:font script="Tfng" typeface="Ebrima"/>
+      </a:majorFont>
+      <a:minorFont>
+        <a:latin typeface="Calibri" panose="020F0502020204030204"/>
+        <a:ea typeface=""/>
+        <a:cs typeface=""/>
+        <a:font script="Jpan" typeface="游ゴシック"/>
+        <a:font script="Hang" typeface="맑은 고딕"/>
+        <a:font script="Hans" typeface="等线"/>
+        <a:font script="Hant" typeface="新細明體"/>
+        <a:font script="Arab" typeface="Arial"/>
+        <a:font script="Hebr" typeface="Arial"/>
+        <a:font script="Thai" typeface="Cordia New"/>
+        <a:font script="Ethi" typeface="Nyala"/>
+        <a:font script="Beng" typeface="Vrinda"/>
+        <a:font script="Gujr" typeface="Shruti"/>
+        <a:font script="Khmr" typeface="DaunPenh"/>
+        <a:font script="Knda" typeface="Tunga"/>
+        <a:font script="Guru" typeface="Raavi"/>
+        <a:font script="Cans" typeface="Euphemia"/>
+        <a:font script="Cher" typeface="Plantagenet Cherokee"/>
+        <a:font script="Yiii" typeface="Microsoft Yi Baiti"/>
+        <a:font script="Tibt" typeface="Microsoft Himalaya"/>
+        <a:font script="Thaa" typeface="MV Boli"/>
+        <a:font script="Deva" typeface="Mangal"/>
+        <a:font script="Telu" typeface="Gautami"/>
+        <a:font script="Taml" typeface="Latha"/>
+        <a:font script="Syrc" typeface="Estrangelo Edessa"/>
+        <a:font script="Orya" typeface="Kalinga"/>
+        <a:font script="Mlym" typeface="Kartika"/>
+        <a:font script="Laoo" typeface="DokChampa"/>
+        <a:font script="Sinh" typeface="Iskoola Pota"/>
+        <a:font script="Mong" typeface="Mongolian Baiti"/>
+        <a:font script="Viet" typeface="Arial"/>
+        <a:font script="Uigh" typeface="Microsoft Uighur"/>
+        <a:font script="Geor" typeface="Sylfaen"/>
+        <a:font script="Armn" typeface="Arial"/>
+        <a:font script="Bugi" typeface="Leelawadee UI"/>
+        <a:font script="Bopo" typeface="Microsoft JhengHei"/>
+        <a:font script="Java" typeface="Javanese Text"/>
+        <a:font script="Lisu" typeface="Segoe UI"/>
+        <a:font script="Mymr" typeface="Myanmar Text"/>
+        <a:font script="Nkoo" typeface="Ebrima"/>
+        <a:font script="Olck" typeface="Nirmala UI"/>
+        <a:font script="Osma" typeface="Ebrima"/>
+        <a:font script="Phag" typeface="Phagspa"/>
+        <a:font script="Syrn" typeface="Estrangelo Edessa"/>
+        <a:font script="Syrj" typeface="Estrangelo Edessa"/>
+        <a:font script="Syre" typeface="Estrangelo Edessa"/>
+        <a:font script="Sora" typeface="Nirmala UI"/>
+        <a:font script="Tale" typeface="Microsoft Tai Le"/>
+        <a:font script="Talu" typeface="Microsoft New Tai Lue"/>
+        <a:font script="Tfng" typeface="Ebrima"/>
+      </a:minorFont>
+    </a:fontScheme>
+    <a:fmtScheme name="Office">
+      <a:fillStyleLst>
+        <a:solidFill>
+          <a:schemeClr val="phClr"/>
+        </a:solidFill>
+        <a:gradFill rotWithShape="1">
+          <a:gsLst>
+            <a:gs pos="0">
+              <a:schemeClr val="phClr">
+                <a:lumMod val="110000"/>
+                <a:satMod val="105000"/>
+                <a:tint val="67000"/>
+              </a:schemeClr>
+            </a:gs>
+            <a:gs pos="50000">
+              <a:schemeClr val="phClr">
+                <a:lumMod val="105000"/>
+                <a:satMod val="103000"/>
+                <a:tint val="73000"/>
+              </a:schemeClr>
+            </a:gs>
+            <a:gs pos="100000">
+              <a:schemeClr val="phClr">
+                <a:lumMod val="105000"/>
+                <a:satMod val="109000"/>
+                <a:tint val="81000"/>
+              </a:schemeClr>
+            </a:gs>
+          </a:gsLst>
+          <a:lin ang="5400000" scaled="0"/>
+        </a:gradFill>
+        <a:gradFill rotWithShape="1">
+          <a:gsLst>
+            <a:gs pos="0">
+              <a:schemeClr val="phClr">
+                <a:satMod val="103000"/>
+                <a:lumMod val="102000"/>
+                <a:tint val="94000"/>
+              </a:schemeClr>
+            </a:gs>
+            <a:gs pos="50000">
+              <a:schemeClr val="phClr">
+                <a:satMod val="110000"/>
+                <a:lumMod val="100000"/>
+                <a:shade val="100000"/>
+              </a:schemeClr>
+            </a:gs>
+            <a:gs pos="100000">
+              <a:schemeClr val="phClr">
+                <a:lumMod val="99000"/>
+                <a:satMod val="120000"/>
+                <a:shade val="78000"/>
+              </a:schemeClr>
+            </a:gs>
+          </a:gsLst>
+          <a:lin ang="5400000" scaled="0"/>
+        </a:gradFill>
+      </a:fillStyleLst>
+      <a:lnStyleLst>
+        <a:ln w="6350" cap="flat" cmpd="sng" algn="ctr">
+          <a:solidFill>
+            <a:schemeClr val="phClr"/>
+          </a:solidFill>
+          <a:prstDash val="solid"/>
+          <a:miter lim="800000"/>
+        </a:ln>
+        <a:ln w="12700" cap="flat" cmpd="sng" algn="ctr">
+          <a:solidFill>
+            <a:schemeClr val="phClr"/>
+          </a:solidFill>
+          <a:prstDash val="solid"/>
+          <a:miter lim="800000"/>
+        </a:ln>
+        <a:ln w="19050" cap="flat" cmpd="sng" algn="ctr">
+          <a:solidFill>
+            <a:schemeClr val="phClr"/>
+          </a:solidFill>
+          <a:prstDash val="solid"/>
+          <a:miter lim="800000"/>
+        </a:ln>
+      </a:lnStyleLst>
+      <a:effectStyleLst>
+        <a:effectStyle>
+          <a:effectLst/>
+        </a:effectStyle>
+        <a:effectStyle>
+          <a:effectLst/>
+        </a:effectStyle>
+        <a:effectStyle>
+          <a:effectLst>
+            <a:outerShdw blurRad="57150" dist="19050" dir="5400000" algn="ctr" rotWithShape="0">
+              <a:srgbClr val="000000">
+                <a:alpha val="63000"/>
+              </a:srgbClr>
+            </a:outerShdw>
+          </a:effectLst>
+        </a:effectStyle>
+      </a:effectStyleLst>
+      <a:bgFillStyleLst>
+        <a:solidFill>
+          <a:schemeClr val="phClr"/>
+        </a:solidFill>
+        <a:solidFill>
+          <a:schemeClr val="phClr">
+            <a:tint val="95000"/>
+            <a:satMod val="170000"/>
+          </a:schemeClr>
+        </a:solidFill>
+        <a:gradFill rotWithShape="1">
+          <a:gsLst>
+            <a:gs pos="0">
+              <a:schemeClr val="phClr">
+                <a:tint val="93000"/>
+                <a:satMod val="150000"/>
+                <a:shade val="98000"/>
+                <a:lumMod val="102000"/>
+              </a:schemeClr>
+            </a:gs>
+            <a:gs pos="50000">
+              <a:schemeClr val="phClr">
+                <a:tint val="98000"/>
+                <a:satMod val="130000"/>
+                <a:shade val="90000"/>
+                <a:lumMod val="103000"/>
+              </a:schemeClr>
+            </a:gs>
+            <a:gs pos="100000">
+              <a:schemeClr val="phClr">
+                <a:shade val="63000"/>
+                <a:satMod val="120000"/>
+              </a:schemeClr>
+            </a:gs>
+          </a:gsLst>
+          <a:lin ang="5400000" scaled="0"/>
+        </a:gradFill>
+      </a:bgFillStyleLst>
+    </a:fmtScheme>
+  </a:themeElements>
+  <a:objectDefaults/>
+  <a:extraClrSchemeLst/>
+  <a:extLst>
+    <a:ext uri="{05A4C25C-085E-4340-85A3-A5531E510DB2}">
+      <thm15:themeFamily xmlns:thm15="http://schemas.microsoft.com/office/thememl/2012/main" name="Office Theme" id="{62F939B6-93AF-4DB8-9C6B-D6C7DFDC589F}" vid="{4A3C46E8-61CC-4603-A589-7422A47A8E4A}"/>
+    </a:ext>
+  </a:extLst>
+</a:theme>
 </file>
</xml_diff>

<commit_message>
added PDF and some updated ipynb files
</commit_message>
<xml_diff>
--- a/Dave/Modeling.pptx
+++ b/Dave/Modeling.pptx
@@ -207,7 +207,7 @@
           <a:p>
             <a:fld id="{C00EAB4B-7875-4BC6-B3D7-FA7FA0BA60C8}" type="datetimeFigureOut">
               <a:rPr lang="en-US" smtClean="0"/>
-              <a:t>12/11/2018</a:t>
+              <a:t>12/12/2018</a:t>
             </a:fld>
             <a:endParaRPr lang="en-US"/>
           </a:p>
@@ -933,7 +933,7 @@
           <a:p>
             <a:fld id="{EC944215-36C0-475B-B3EE-A34D4AF33D06}" type="datetimeFigureOut">
               <a:rPr lang="en-US" smtClean="0"/>
-              <a:t>12/11/2018</a:t>
+              <a:t>12/12/2018</a:t>
             </a:fld>
             <a:endParaRPr lang="en-US"/>
           </a:p>
@@ -1131,7 +1131,7 @@
           <a:p>
             <a:fld id="{EC944215-36C0-475B-B3EE-A34D4AF33D06}" type="datetimeFigureOut">
               <a:rPr lang="en-US" smtClean="0"/>
-              <a:t>12/11/2018</a:t>
+              <a:t>12/12/2018</a:t>
             </a:fld>
             <a:endParaRPr lang="en-US"/>
           </a:p>
@@ -1339,7 +1339,7 @@
           <a:p>
             <a:fld id="{EC944215-36C0-475B-B3EE-A34D4AF33D06}" type="datetimeFigureOut">
               <a:rPr lang="en-US" smtClean="0"/>
-              <a:t>12/11/2018</a:t>
+              <a:t>12/12/2018</a:t>
             </a:fld>
             <a:endParaRPr lang="en-US"/>
           </a:p>
@@ -2247,7 +2247,7 @@
           <a:p>
             <a:fld id="{EC944215-36C0-475B-B3EE-A34D4AF33D06}" type="datetimeFigureOut">
               <a:rPr lang="en-US" smtClean="0"/>
-              <a:t>12/11/2018</a:t>
+              <a:t>12/12/2018</a:t>
             </a:fld>
             <a:endParaRPr lang="en-US"/>
           </a:p>
@@ -2522,7 +2522,7 @@
           <a:p>
             <a:fld id="{EC944215-36C0-475B-B3EE-A34D4AF33D06}" type="datetimeFigureOut">
               <a:rPr lang="en-US" smtClean="0"/>
-              <a:t>12/11/2018</a:t>
+              <a:t>12/12/2018</a:t>
             </a:fld>
             <a:endParaRPr lang="en-US"/>
           </a:p>
@@ -2787,7 +2787,7 @@
           <a:p>
             <a:fld id="{EC944215-36C0-475B-B3EE-A34D4AF33D06}" type="datetimeFigureOut">
               <a:rPr lang="en-US" smtClean="0"/>
-              <a:t>12/11/2018</a:t>
+              <a:t>12/12/2018</a:t>
             </a:fld>
             <a:endParaRPr lang="en-US"/>
           </a:p>
@@ -3199,7 +3199,7 @@
           <a:p>
             <a:fld id="{EC944215-36C0-475B-B3EE-A34D4AF33D06}" type="datetimeFigureOut">
               <a:rPr lang="en-US" smtClean="0"/>
-              <a:t>12/11/2018</a:t>
+              <a:t>12/12/2018</a:t>
             </a:fld>
             <a:endParaRPr lang="en-US"/>
           </a:p>
@@ -3340,7 +3340,7 @@
           <a:p>
             <a:fld id="{EC944215-36C0-475B-B3EE-A34D4AF33D06}" type="datetimeFigureOut">
               <a:rPr lang="en-US" smtClean="0"/>
-              <a:t>12/11/2018</a:t>
+              <a:t>12/12/2018</a:t>
             </a:fld>
             <a:endParaRPr lang="en-US"/>
           </a:p>
@@ -3453,7 +3453,7 @@
           <a:p>
             <a:fld id="{EC944215-36C0-475B-B3EE-A34D4AF33D06}" type="datetimeFigureOut">
               <a:rPr lang="en-US" smtClean="0"/>
-              <a:t>12/11/2018</a:t>
+              <a:t>12/12/2018</a:t>
             </a:fld>
             <a:endParaRPr lang="en-US"/>
           </a:p>
@@ -3764,7 +3764,7 @@
           <a:p>
             <a:fld id="{EC944215-36C0-475B-B3EE-A34D4AF33D06}" type="datetimeFigureOut">
               <a:rPr lang="en-US" smtClean="0"/>
-              <a:t>12/11/2018</a:t>
+              <a:t>12/12/2018</a:t>
             </a:fld>
             <a:endParaRPr lang="en-US"/>
           </a:p>
@@ -4052,7 +4052,7 @@
           <a:p>
             <a:fld id="{EC944215-36C0-475B-B3EE-A34D4AF33D06}" type="datetimeFigureOut">
               <a:rPr lang="en-US" smtClean="0"/>
-              <a:t>12/11/2018</a:t>
+              <a:t>12/12/2018</a:t>
             </a:fld>
             <a:endParaRPr lang="en-US"/>
           </a:p>
@@ -4323,7 +4323,7 @@
           <a:p>
             <a:fld id="{EC944215-36C0-475B-B3EE-A34D4AF33D06}" type="datetimeFigureOut">
               <a:rPr lang="en-US" smtClean="0"/>
-              <a:t>12/11/2018</a:t>
+              <a:t>12/12/2018</a:t>
             </a:fld>
             <a:endParaRPr lang="en-US"/>
           </a:p>
@@ -5046,8 +5046,8 @@
               <a:buChar char="•"/>
             </a:pPr>
             <a:r>
-              <a:rPr lang="en-US" sz="2400" dirty="0"/>
-              <a:t>Weight – 97% missing, removed from analysis</a:t>
+              <a:rPr lang="en-US" sz="2100" dirty="0"/>
+              <a:t>Initial shape – 101,767 observations, 50 features</a:t>
             </a:r>
           </a:p>
           <a:p>
@@ -5055,17 +5055,17 @@
               <a:buFont typeface="Arial" panose="020B0604020202020204" pitchFamily="34" charset="0"/>
               <a:buChar char="•"/>
             </a:pPr>
-            <a:r>
-              <a:rPr lang="en-US" sz="2400" dirty="0"/>
-              <a:t>Payer Code – 40% missing, removed</a:t>
-            </a:r>
+            <a:endParaRPr lang="en-US" sz="2100" dirty="0"/>
           </a:p>
           <a:p>
             <a:pPr marL="285750" indent="-285750">
               <a:buFont typeface="Arial" panose="020B0604020202020204" pitchFamily="34" charset="0"/>
               <a:buChar char="•"/>
             </a:pPr>
-            <a:endParaRPr lang="en-US" sz="2400" dirty="0"/>
+            <a:r>
+              <a:rPr lang="en-US" sz="2100" dirty="0"/>
+              <a:t>Weight – 97% missing, removed from analysis</a:t>
+            </a:r>
           </a:p>
           <a:p>
             <a:pPr marL="285750" indent="-285750">
@@ -5073,7 +5073,24 @@
               <a:buChar char="•"/>
             </a:pPr>
             <a:r>
-              <a:rPr lang="en-US" sz="2400" dirty="0"/>
+              <a:rPr lang="en-US" sz="2100" dirty="0"/>
+              <a:t>Payer Code – 40% missing, removed</a:t>
+            </a:r>
+          </a:p>
+          <a:p>
+            <a:pPr marL="285750" indent="-285750">
+              <a:buFont typeface="Arial" panose="020B0604020202020204" pitchFamily="34" charset="0"/>
+              <a:buChar char="•"/>
+            </a:pPr>
+            <a:endParaRPr lang="en-US" sz="2100" dirty="0"/>
+          </a:p>
+          <a:p>
+            <a:pPr marL="285750" indent="-285750">
+              <a:buFont typeface="Arial" panose="020B0604020202020204" pitchFamily="34" charset="0"/>
+              <a:buChar char="•"/>
+            </a:pPr>
+            <a:r>
+              <a:rPr lang="en-US" sz="2100" dirty="0"/>
               <a:t>Admission type/source and disposition (release) type:</a:t>
             </a:r>
           </a:p>
@@ -5083,7 +5100,7 @@
               <a:buChar char="•"/>
             </a:pPr>
             <a:r>
-              <a:rPr lang="en-US" sz="2400" dirty="0"/>
+              <a:rPr lang="en-US" sz="2100" dirty="0"/>
               <a:t>Numerically-coded columns; curated and condensed into categories</a:t>
             </a:r>
           </a:p>
@@ -5093,7 +5110,7 @@
               <a:buChar char="•"/>
             </a:pPr>
             <a:r>
-              <a:rPr lang="en-US" sz="2400" dirty="0"/>
+              <a:rPr lang="en-US" sz="2100" dirty="0"/>
               <a:t>Removed patients who died in the hospital</a:t>
             </a:r>
           </a:p>
@@ -5102,7 +5119,7 @@
               <a:buFont typeface="Arial" panose="020B0604020202020204" pitchFamily="34" charset="0"/>
               <a:buChar char="•"/>
             </a:pPr>
-            <a:endParaRPr lang="en-US" sz="2400" dirty="0"/>
+            <a:endParaRPr lang="en-US" sz="2100" dirty="0"/>
           </a:p>
           <a:p>
             <a:pPr marL="285750" indent="-285750">
@@ -5110,7 +5127,7 @@
               <a:buChar char="•"/>
             </a:pPr>
             <a:r>
-              <a:rPr lang="en-US" sz="2400" dirty="0"/>
+              <a:rPr lang="en-US" sz="2100" dirty="0"/>
               <a:t>Patient diagnosis codes:</a:t>
             </a:r>
           </a:p>
@@ -5120,23 +5137,23 @@
               <a:buChar char="•"/>
             </a:pPr>
             <a:r>
-              <a:rPr lang="en-US" sz="2400" dirty="0"/>
+              <a:rPr lang="en-US" sz="2100" dirty="0"/>
               <a:t>Series of numeric codes </a:t>
             </a:r>
             <a:r>
-              <a:rPr lang="en-US" sz="2400" dirty="0" err="1"/>
+              <a:rPr lang="en-US" sz="2100" dirty="0" err="1"/>
               <a:t>XXX.xx</a:t>
             </a:r>
             <a:r>
-              <a:rPr lang="en-US" sz="2400" dirty="0"/>
+              <a:rPr lang="en-US" sz="2100" dirty="0"/>
               <a:t>. Converted these to categorical diagnosis types (respiratory, neurological, oncology, injury, </a:t>
             </a:r>
             <a:r>
-              <a:rPr lang="en-US" sz="2400" dirty="0" err="1"/>
+              <a:rPr lang="en-US" sz="2100" dirty="0" err="1"/>
               <a:t>etc</a:t>
             </a:r>
             <a:r>
-              <a:rPr lang="en-US" sz="2400" dirty="0"/>
+              <a:rPr lang="en-US" sz="2100" dirty="0"/>
               <a:t>)</a:t>
             </a:r>
           </a:p>
@@ -5145,7 +5162,7 @@
               <a:buFont typeface="Arial" panose="020B0604020202020204" pitchFamily="34" charset="0"/>
               <a:buChar char="•"/>
             </a:pPr>
-            <a:endParaRPr lang="en-US" sz="2400" dirty="0"/>
+            <a:endParaRPr lang="en-US" sz="2100" dirty="0"/>
           </a:p>
           <a:p>
             <a:pPr marL="285750" indent="-285750">
@@ -5153,7 +5170,7 @@
               <a:buChar char="•"/>
             </a:pPr>
             <a:r>
-              <a:rPr lang="en-US" sz="2400" dirty="0"/>
+              <a:rPr lang="en-US" sz="2100" dirty="0"/>
               <a:t> 24 medications – removed 7 with essentially no values. </a:t>
             </a:r>
           </a:p>
@@ -5163,7 +5180,7 @@
               <a:buChar char="•"/>
             </a:pPr>
             <a:r>
-              <a:rPr lang="en-US" sz="2400" dirty="0"/>
+              <a:rPr lang="en-US" sz="2100" dirty="0"/>
               <a:t> Converted [‘No’, ‘Steady’, ‘Up’, ‘Down’] to [‘No’, ‘Yes’]</a:t>
             </a:r>
           </a:p>
@@ -5173,7 +5190,7 @@
               <a:buChar char="•"/>
             </a:pPr>
             <a:r>
-              <a:rPr lang="en-US" sz="2400" dirty="0"/>
+              <a:rPr lang="en-US" sz="2100" dirty="0"/>
               <a:t>Is the patient taking this medication or not?</a:t>
             </a:r>
           </a:p>
@@ -5424,7 +5441,12 @@
             <p:ph type="title"/>
           </p:nvPr>
         </p:nvSpPr>
-        <p:spPr/>
+        <p:spPr>
+          <a:xfrm>
+            <a:off x="838200" y="365125"/>
+            <a:ext cx="10515600" cy="805949"/>
+          </a:xfrm>
+        </p:spPr>
         <p:txBody>
           <a:bodyPr/>
           <a:lstStyle/>
@@ -5432,7 +5454,7 @@
             <a:pPr algn="ctr"/>
             <a:r>
               <a:rPr lang="en-US" dirty="0"/>
-              <a:t>Removal of Observations</a:t>
+              <a:t>Removal of Train Set Observations</a:t>
             </a:r>
           </a:p>
         </p:txBody>
@@ -5453,7 +5475,12 @@
             <p:ph idx="1"/>
           </p:nvPr>
         </p:nvSpPr>
-        <p:spPr/>
+        <p:spPr>
+          <a:xfrm>
+            <a:off x="453189" y="1351546"/>
+            <a:ext cx="10515600" cy="5173579"/>
+          </a:xfrm>
+        </p:spPr>
         <p:txBody>
           <a:bodyPr>
             <a:normAutofit fontScale="92500" lnSpcReduction="20000"/>
@@ -5484,6 +5511,14 @@
             <a:endParaRPr lang="en-US" dirty="0"/>
           </a:p>
           <a:p>
+            <a:pPr lvl="1"/>
+            <a:endParaRPr lang="en-US" dirty="0"/>
+          </a:p>
+          <a:p>
+            <a:pPr lvl="1"/>
+            <a:endParaRPr lang="en-US" dirty="0"/>
+          </a:p>
+          <a:p>
             <a:r>
               <a:rPr lang="en-US" dirty="0"/>
               <a:t>Removed them from the train set (</a:t>
@@ -5519,7 +5554,16 @@
             </a:r>
             <a:r>
               <a:rPr lang="en-US" dirty="0"/>
-              <a:t>, added back only middle observations with linear predict &lt; X</a:t>
+              <a:t>, added </a:t>
+            </a:r>
+          </a:p>
+          <a:p>
+            <a:pPr marL="0" indent="0">
+              <a:buNone/>
+            </a:pPr>
+            <a:r>
+              <a:rPr lang="en-US" dirty="0"/>
+              <a:t>back only middle observations with linear predict&lt;X</a:t>
             </a:r>
           </a:p>
           <a:p>
@@ -5533,7 +5577,7 @@
             <a:pPr lvl="1"/>
             <a:r>
               <a:rPr lang="en-US" b="1" dirty="0"/>
-              <a:t>X = 0.75 – 0.6675  --  amounted to about 2% of observations removed</a:t>
+              <a:t>X = 0.75 – 0.6675  --  about 2% of observations removed</a:t>
             </a:r>
           </a:p>
           <a:p>
@@ -5548,6 +5592,415 @@
             <a:r>
               <a:rPr lang="en-US" dirty="0"/>
               <a:t>X = 0.25 – 0.6622</a:t>
+            </a:r>
+          </a:p>
+        </p:txBody>
+      </p:sp>
+      <p:sp>
+        <p:nvSpPr>
+          <p:cNvPr id="4" name="Rectangle 3">
+            <a:extLst>
+              <a:ext uri="{FF2B5EF4-FFF2-40B4-BE49-F238E27FC236}">
+                <a16:creationId xmlns:a16="http://schemas.microsoft.com/office/drawing/2014/main" id="{41F7E411-99A0-46F4-8D12-C459C9A8718B}"/>
+              </a:ext>
+            </a:extLst>
+          </p:cNvPr>
+          <p:cNvSpPr/>
+          <p:nvPr/>
+        </p:nvSpPr>
+        <p:spPr>
+          <a:xfrm>
+            <a:off x="7764379" y="4093028"/>
+            <a:ext cx="970547" cy="120172"/>
+          </a:xfrm>
+          <a:prstGeom prst="rect">
+            <a:avLst/>
+          </a:prstGeom>
+        </p:spPr>
+        <p:style>
+          <a:lnRef idx="2">
+            <a:schemeClr val="accent1">
+              <a:shade val="50000"/>
+            </a:schemeClr>
+          </a:lnRef>
+          <a:fillRef idx="1">
+            <a:schemeClr val="accent1"/>
+          </a:fillRef>
+          <a:effectRef idx="0">
+            <a:schemeClr val="accent1"/>
+          </a:effectRef>
+          <a:fontRef idx="minor">
+            <a:schemeClr val="lt1"/>
+          </a:fontRef>
+        </p:style>
+        <p:txBody>
+          <a:bodyPr rtlCol="0" anchor="ctr"/>
+          <a:lstStyle/>
+          <a:p>
+            <a:pPr algn="ctr"/>
+            <a:endParaRPr lang="en-US"/>
+          </a:p>
+        </p:txBody>
+      </p:sp>
+      <p:sp>
+        <p:nvSpPr>
+          <p:cNvPr id="5" name="Rectangle 4">
+            <a:extLst>
+              <a:ext uri="{FF2B5EF4-FFF2-40B4-BE49-F238E27FC236}">
+                <a16:creationId xmlns:a16="http://schemas.microsoft.com/office/drawing/2014/main" id="{A3BBBAE8-DFFD-433A-8D6F-A187FACA2684}"/>
+              </a:ext>
+            </a:extLst>
+          </p:cNvPr>
+          <p:cNvSpPr/>
+          <p:nvPr/>
+        </p:nvSpPr>
+        <p:spPr>
+          <a:xfrm>
+            <a:off x="10768264" y="3360818"/>
+            <a:ext cx="970547" cy="850231"/>
+          </a:xfrm>
+          <a:prstGeom prst="rect">
+            <a:avLst/>
+          </a:prstGeom>
+        </p:spPr>
+        <p:style>
+          <a:lnRef idx="2">
+            <a:schemeClr val="accent1">
+              <a:shade val="50000"/>
+            </a:schemeClr>
+          </a:lnRef>
+          <a:fillRef idx="1">
+            <a:schemeClr val="accent1"/>
+          </a:fillRef>
+          <a:effectRef idx="0">
+            <a:schemeClr val="accent1"/>
+          </a:effectRef>
+          <a:fontRef idx="minor">
+            <a:schemeClr val="lt1"/>
+          </a:fontRef>
+        </p:style>
+        <p:txBody>
+          <a:bodyPr rtlCol="0" anchor="ctr"/>
+          <a:lstStyle/>
+          <a:p>
+            <a:pPr algn="ctr"/>
+            <a:endParaRPr lang="en-US"/>
+          </a:p>
+        </p:txBody>
+      </p:sp>
+      <p:sp>
+        <p:nvSpPr>
+          <p:cNvPr id="7" name="Right Triangle 6">
+            <a:extLst>
+              <a:ext uri="{FF2B5EF4-FFF2-40B4-BE49-F238E27FC236}">
+                <a16:creationId xmlns:a16="http://schemas.microsoft.com/office/drawing/2014/main" id="{C3F43DE4-29D9-48EC-ADFC-793F36D46741}"/>
+              </a:ext>
+            </a:extLst>
+          </p:cNvPr>
+          <p:cNvSpPr/>
+          <p:nvPr/>
+        </p:nvSpPr>
+        <p:spPr>
+          <a:xfrm rot="10800000" flipV="1">
+            <a:off x="8734926" y="3360818"/>
+            <a:ext cx="2033338" cy="852381"/>
+          </a:xfrm>
+          <a:prstGeom prst="rtTriangle">
+            <a:avLst/>
+          </a:prstGeom>
+          <a:solidFill>
+            <a:srgbClr val="92D050"/>
+          </a:solidFill>
+        </p:spPr>
+        <p:style>
+          <a:lnRef idx="2">
+            <a:schemeClr val="accent1">
+              <a:shade val="50000"/>
+            </a:schemeClr>
+          </a:lnRef>
+          <a:fillRef idx="1">
+            <a:schemeClr val="accent1"/>
+          </a:fillRef>
+          <a:effectRef idx="0">
+            <a:schemeClr val="accent1"/>
+          </a:effectRef>
+          <a:fontRef idx="minor">
+            <a:schemeClr val="lt1"/>
+          </a:fontRef>
+        </p:style>
+        <p:txBody>
+          <a:bodyPr rtlCol="0" anchor="ctr"/>
+          <a:lstStyle/>
+          <a:p>
+            <a:pPr algn="ctr"/>
+            <a:endParaRPr lang="en-US"/>
+          </a:p>
+        </p:txBody>
+      </p:sp>
+      <p:sp>
+        <p:nvSpPr>
+          <p:cNvPr id="8" name="TextBox 7">
+            <a:extLst>
+              <a:ext uri="{FF2B5EF4-FFF2-40B4-BE49-F238E27FC236}">
+                <a16:creationId xmlns:a16="http://schemas.microsoft.com/office/drawing/2014/main" id="{38E48F64-7EED-47F4-83A1-3C1C971B04B6}"/>
+              </a:ext>
+            </a:extLst>
+          </p:cNvPr>
+          <p:cNvSpPr txBox="1"/>
+          <p:nvPr/>
+        </p:nvSpPr>
+        <p:spPr>
+          <a:xfrm>
+            <a:off x="7705446" y="2590799"/>
+            <a:ext cx="945708" cy="553998"/>
+          </a:xfrm>
+          <a:prstGeom prst="rect">
+            <a:avLst/>
+          </a:prstGeom>
+          <a:noFill/>
+        </p:spPr>
+        <p:txBody>
+          <a:bodyPr wrap="none" rtlCol="0">
+            <a:spAutoFit/>
+          </a:bodyPr>
+          <a:lstStyle/>
+          <a:p>
+            <a:pPr algn="ctr"/>
+            <a:r>
+              <a:rPr lang="en-US" sz="1500" dirty="0"/>
+              <a:t>No return</a:t>
+            </a:r>
+          </a:p>
+          <a:p>
+            <a:pPr algn="ctr"/>
+            <a:r>
+              <a:rPr lang="en-US" sz="1500" dirty="0"/>
+              <a:t>=0</a:t>
+            </a:r>
+          </a:p>
+        </p:txBody>
+      </p:sp>
+      <p:sp>
+        <p:nvSpPr>
+          <p:cNvPr id="9" name="TextBox 8">
+            <a:extLst>
+              <a:ext uri="{FF2B5EF4-FFF2-40B4-BE49-F238E27FC236}">
+                <a16:creationId xmlns:a16="http://schemas.microsoft.com/office/drawing/2014/main" id="{AA4B231E-9469-4DFA-B265-71EABC8D8A9B}"/>
+              </a:ext>
+            </a:extLst>
+          </p:cNvPr>
+          <p:cNvSpPr txBox="1"/>
+          <p:nvPr/>
+        </p:nvSpPr>
+        <p:spPr>
+          <a:xfrm>
+            <a:off x="10777129" y="2590799"/>
+            <a:ext cx="1049070" cy="553998"/>
+          </a:xfrm>
+          <a:prstGeom prst="rect">
+            <a:avLst/>
+          </a:prstGeom>
+          <a:noFill/>
+        </p:spPr>
+        <p:txBody>
+          <a:bodyPr wrap="none" rtlCol="0">
+            <a:spAutoFit/>
+          </a:bodyPr>
+          <a:lstStyle/>
+          <a:p>
+            <a:pPr algn="ctr"/>
+            <a:r>
+              <a:rPr lang="en-US" sz="1500" dirty="0"/>
+              <a:t>Return &lt;30</a:t>
+            </a:r>
+          </a:p>
+          <a:p>
+            <a:pPr algn="ctr"/>
+            <a:r>
+              <a:rPr lang="en-US" sz="1500" dirty="0"/>
+              <a:t>=1</a:t>
+            </a:r>
+          </a:p>
+        </p:txBody>
+      </p:sp>
+      <p:sp>
+        <p:nvSpPr>
+          <p:cNvPr id="10" name="TextBox 9">
+            <a:extLst>
+              <a:ext uri="{FF2B5EF4-FFF2-40B4-BE49-F238E27FC236}">
+                <a16:creationId xmlns:a16="http://schemas.microsoft.com/office/drawing/2014/main" id="{01F7B1DD-3908-4986-AE2A-766B055F8E97}"/>
+              </a:ext>
+            </a:extLst>
+          </p:cNvPr>
+          <p:cNvSpPr txBox="1"/>
+          <p:nvPr/>
+        </p:nvSpPr>
+        <p:spPr>
+          <a:xfrm>
+            <a:off x="8806040" y="2590799"/>
+            <a:ext cx="1816203" cy="784830"/>
+          </a:xfrm>
+          <a:prstGeom prst="rect">
+            <a:avLst/>
+          </a:prstGeom>
+          <a:noFill/>
+        </p:spPr>
+        <p:txBody>
+          <a:bodyPr wrap="none" rtlCol="0">
+            <a:spAutoFit/>
+          </a:bodyPr>
+          <a:lstStyle/>
+          <a:p>
+            <a:pPr algn="ctr"/>
+            <a:r>
+              <a:rPr lang="en-US" sz="1500" dirty="0"/>
+              <a:t>Return &gt;30</a:t>
+            </a:r>
+          </a:p>
+          <a:p>
+            <a:pPr algn="ctr"/>
+            <a:r>
+              <a:rPr lang="en-US" sz="1500" dirty="0"/>
+              <a:t>Linear regression 0-1</a:t>
+            </a:r>
+          </a:p>
+          <a:p>
+            <a:pPr algn="ctr"/>
+            <a:endParaRPr lang="en-US" sz="1500" dirty="0"/>
+          </a:p>
+        </p:txBody>
+      </p:sp>
+      <p:sp>
+        <p:nvSpPr>
+          <p:cNvPr id="11" name="Rectangle 10">
+            <a:extLst>
+              <a:ext uri="{FF2B5EF4-FFF2-40B4-BE49-F238E27FC236}">
+                <a16:creationId xmlns:a16="http://schemas.microsoft.com/office/drawing/2014/main" id="{5D0A348D-68FF-4491-A058-9B1E6F0BF4FF}"/>
+              </a:ext>
+            </a:extLst>
+          </p:cNvPr>
+          <p:cNvSpPr/>
+          <p:nvPr/>
+        </p:nvSpPr>
+        <p:spPr>
+          <a:xfrm>
+            <a:off x="10515600" y="3256547"/>
+            <a:ext cx="252664" cy="1130969"/>
+          </a:xfrm>
+          <a:prstGeom prst="rect">
+            <a:avLst/>
+          </a:prstGeom>
+          <a:solidFill>
+            <a:srgbClr val="FFFF00">
+              <a:alpha val="46000"/>
+            </a:srgbClr>
+          </a:solidFill>
+        </p:spPr>
+        <p:style>
+          <a:lnRef idx="2">
+            <a:schemeClr val="accent4">
+              <a:shade val="50000"/>
+            </a:schemeClr>
+          </a:lnRef>
+          <a:fillRef idx="1">
+            <a:schemeClr val="accent4"/>
+          </a:fillRef>
+          <a:effectRef idx="0">
+            <a:schemeClr val="accent4"/>
+          </a:effectRef>
+          <a:fontRef idx="minor">
+            <a:schemeClr val="lt1"/>
+          </a:fontRef>
+        </p:style>
+        <p:txBody>
+          <a:bodyPr rtlCol="0" anchor="ctr"/>
+          <a:lstStyle/>
+          <a:p>
+            <a:pPr algn="ctr"/>
+            <a:endParaRPr lang="en-US"/>
+          </a:p>
+        </p:txBody>
+      </p:sp>
+      <p:cxnSp>
+        <p:nvCxnSpPr>
+          <p:cNvPr id="13" name="Straight Arrow Connector 12">
+            <a:extLst>
+              <a:ext uri="{FF2B5EF4-FFF2-40B4-BE49-F238E27FC236}">
+                <a16:creationId xmlns:a16="http://schemas.microsoft.com/office/drawing/2014/main" id="{9D6D0168-6EFE-4FDC-AB89-14943114F9A5}"/>
+              </a:ext>
+            </a:extLst>
+          </p:cNvPr>
+          <p:cNvCxnSpPr>
+            <a:cxnSpLocks/>
+          </p:cNvCxnSpPr>
+          <p:nvPr/>
+        </p:nvCxnSpPr>
+        <p:spPr>
+          <a:xfrm flipV="1">
+            <a:off x="10654327" y="4429910"/>
+            <a:ext cx="0" cy="422825"/>
+          </a:xfrm>
+          <a:prstGeom prst="straightConnector1">
+            <a:avLst/>
+          </a:prstGeom>
+          <a:ln w="25400">
+            <a:tailEnd type="triangle"/>
+          </a:ln>
+        </p:spPr>
+        <p:style>
+          <a:lnRef idx="1">
+            <a:schemeClr val="accent1"/>
+          </a:lnRef>
+          <a:fillRef idx="0">
+            <a:schemeClr val="accent1"/>
+          </a:fillRef>
+          <a:effectRef idx="0">
+            <a:schemeClr val="accent1"/>
+          </a:effectRef>
+          <a:fontRef idx="minor">
+            <a:schemeClr val="tx1"/>
+          </a:fontRef>
+        </p:style>
+      </p:cxnSp>
+      <p:sp>
+        <p:nvSpPr>
+          <p:cNvPr id="15" name="TextBox 14">
+            <a:extLst>
+              <a:ext uri="{FF2B5EF4-FFF2-40B4-BE49-F238E27FC236}">
+                <a16:creationId xmlns:a16="http://schemas.microsoft.com/office/drawing/2014/main" id="{EB3DA522-D2B0-4717-A4AE-0B5D1AB00AC4}"/>
+              </a:ext>
+            </a:extLst>
+          </p:cNvPr>
+          <p:cNvSpPr txBox="1"/>
+          <p:nvPr/>
+        </p:nvSpPr>
+        <p:spPr>
+          <a:xfrm>
+            <a:off x="9823000" y="4966079"/>
+            <a:ext cx="1660354" cy="1246495"/>
+          </a:xfrm>
+          <a:prstGeom prst="rect">
+            <a:avLst/>
+          </a:prstGeom>
+          <a:noFill/>
+        </p:spPr>
+        <p:txBody>
+          <a:bodyPr wrap="square" rtlCol="0">
+            <a:spAutoFit/>
+          </a:bodyPr>
+          <a:lstStyle/>
+          <a:p>
+            <a:pPr algn="ctr"/>
+            <a:r>
+              <a:rPr lang="en-US" sz="1500" dirty="0"/>
+              <a:t>Returns &gt;30</a:t>
+            </a:r>
+          </a:p>
+          <a:p>
+            <a:pPr algn="ctr"/>
+            <a:r>
+              <a:rPr lang="en-US" sz="1500" dirty="0"/>
+              <a:t>Very similar to returns &lt;30 removed from train set</a:t>
             </a:r>
           </a:p>
         </p:txBody>

</xml_diff>